<commit_message>
Added client to the development flow
</commit_message>
<xml_diff>
--- a/Documentation/Demo/Demo_01.pptx
+++ b/Documentation/Demo/Demo_01.pptx
@@ -106,6 +106,11 @@
       </a:defRPr>
     </a:lvl9pPr>
   </p:defaultTextStyle>
+  <p:extLst>
+    <p:ext uri="{EFAFB233-063F-42B5-8137-9DF3F51BA10A}">
+      <p15:sldGuideLst xmlns:p15="http://schemas.microsoft.com/office/powerpoint/2012/main"/>
+    </p:ext>
+  </p:extLst>
 </p:presentation>
 </file>
 
@@ -611,7 +616,7 @@
           <a:p>
             <a:fld id="{48A87A34-81AB-432B-8DAE-1953F412C126}" type="datetimeFigureOut">
               <a:rPr lang="en-US" smtClean="0"/>
-              <a:t>5/23/2016</a:t>
+              <a:t>5/24/2016</a:t>
             </a:fld>
             <a:endParaRPr lang="en-US" dirty="0"/>
           </a:p>
@@ -907,7 +912,7 @@
             <a:fld id="{48A87A34-81AB-432B-8DAE-1953F412C126}" type="datetimeFigureOut">
               <a:rPr lang="en-US" smtClean="0"/>
               <a:pPr/>
-              <a:t>5/23/2016</a:t>
+              <a:t>5/24/2016</a:t>
             </a:fld>
             <a:endParaRPr lang="en-US" dirty="0"/>
           </a:p>
@@ -1157,7 +1162,7 @@
             <a:fld id="{48A87A34-81AB-432B-8DAE-1953F412C126}" type="datetimeFigureOut">
               <a:rPr lang="en-US" smtClean="0"/>
               <a:pPr/>
-              <a:t>5/23/2016</a:t>
+              <a:t>5/24/2016</a:t>
             </a:fld>
             <a:endParaRPr lang="en-US" dirty="0"/>
           </a:p>
@@ -1699,7 +1704,7 @@
             <a:fld id="{48A87A34-81AB-432B-8DAE-1953F412C126}" type="datetimeFigureOut">
               <a:rPr lang="en-US" smtClean="0"/>
               <a:pPr/>
-              <a:t>5/23/2016</a:t>
+              <a:t>5/24/2016</a:t>
             </a:fld>
             <a:endParaRPr lang="en-US" dirty="0"/>
           </a:p>
@@ -1949,7 +1954,7 @@
             <a:fld id="{48A87A34-81AB-432B-8DAE-1953F412C126}" type="datetimeFigureOut">
               <a:rPr lang="en-US" smtClean="0"/>
               <a:pPr/>
-              <a:t>5/23/2016</a:t>
+              <a:t>5/24/2016</a:t>
             </a:fld>
             <a:endParaRPr lang="en-US" dirty="0"/>
           </a:p>
@@ -2483,7 +2488,7 @@
             <a:fld id="{48A87A34-81AB-432B-8DAE-1953F412C126}" type="datetimeFigureOut">
               <a:rPr lang="en-US" smtClean="0"/>
               <a:pPr/>
-              <a:t>5/23/2016</a:t>
+              <a:t>5/24/2016</a:t>
             </a:fld>
             <a:endParaRPr lang="en-US" dirty="0"/>
           </a:p>
@@ -2782,7 +2787,7 @@
             <a:fld id="{48A87A34-81AB-432B-8DAE-1953F412C126}" type="datetimeFigureOut">
               <a:rPr lang="en-US" smtClean="0"/>
               <a:pPr/>
-              <a:t>5/23/2016</a:t>
+              <a:t>5/24/2016</a:t>
             </a:fld>
             <a:endParaRPr lang="en-US" dirty="0"/>
           </a:p>
@@ -2957,7 +2962,7 @@
           <a:p>
             <a:fld id="{48A87A34-81AB-432B-8DAE-1953F412C126}" type="datetimeFigureOut">
               <a:rPr lang="en-US" smtClean="0"/>
-              <a:t>5/23/2016</a:t>
+              <a:t>5/24/2016</a:t>
             </a:fld>
             <a:endParaRPr lang="en-US" dirty="0"/>
           </a:p>
@@ -3137,7 +3142,7 @@
           <a:p>
             <a:fld id="{48A87A34-81AB-432B-8DAE-1953F412C126}" type="datetimeFigureOut">
               <a:rPr lang="en-US" smtClean="0"/>
-              <a:t>5/23/2016</a:t>
+              <a:t>5/24/2016</a:t>
             </a:fld>
             <a:endParaRPr lang="en-US" dirty="0"/>
           </a:p>
@@ -3307,7 +3312,7 @@
           <a:p>
             <a:fld id="{48A87A34-81AB-432B-8DAE-1953F412C126}" type="datetimeFigureOut">
               <a:rPr lang="en-US" smtClean="0"/>
-              <a:t>5/23/2016</a:t>
+              <a:t>5/24/2016</a:t>
             </a:fld>
             <a:endParaRPr lang="en-US" dirty="0"/>
           </a:p>
@@ -3558,7 +3563,7 @@
           <a:p>
             <a:fld id="{48A87A34-81AB-432B-8DAE-1953F412C126}" type="datetimeFigureOut">
               <a:rPr lang="en-US" smtClean="0"/>
-              <a:t>5/23/2016</a:t>
+              <a:t>5/24/2016</a:t>
             </a:fld>
             <a:endParaRPr lang="en-US" dirty="0"/>
           </a:p>
@@ -3855,7 +3860,7 @@
           <a:p>
             <a:fld id="{48A87A34-81AB-432B-8DAE-1953F412C126}" type="datetimeFigureOut">
               <a:rPr lang="en-US" smtClean="0"/>
-              <a:t>5/23/2016</a:t>
+              <a:t>5/24/2016</a:t>
             </a:fld>
             <a:endParaRPr lang="en-US" dirty="0"/>
           </a:p>
@@ -4297,7 +4302,7 @@
           <a:p>
             <a:fld id="{48A87A34-81AB-432B-8DAE-1953F412C126}" type="datetimeFigureOut">
               <a:rPr lang="en-US" smtClean="0"/>
-              <a:t>5/23/2016</a:t>
+              <a:t>5/24/2016</a:t>
             </a:fld>
             <a:endParaRPr lang="en-US" dirty="0"/>
           </a:p>
@@ -4415,7 +4420,7 @@
           <a:p>
             <a:fld id="{48A87A34-81AB-432B-8DAE-1953F412C126}" type="datetimeFigureOut">
               <a:rPr lang="en-US" smtClean="0"/>
-              <a:t>5/23/2016</a:t>
+              <a:t>5/24/2016</a:t>
             </a:fld>
             <a:endParaRPr lang="en-US" dirty="0"/>
           </a:p>
@@ -4510,7 +4515,7 @@
           <a:p>
             <a:fld id="{48A87A34-81AB-432B-8DAE-1953F412C126}" type="datetimeFigureOut">
               <a:rPr lang="en-US" smtClean="0"/>
-              <a:t>5/23/2016</a:t>
+              <a:t>5/24/2016</a:t>
             </a:fld>
             <a:endParaRPr lang="en-US" dirty="0"/>
           </a:p>
@@ -4793,7 +4798,7 @@
           <a:p>
             <a:fld id="{48A87A34-81AB-432B-8DAE-1953F412C126}" type="datetimeFigureOut">
               <a:rPr lang="en-US" smtClean="0"/>
-              <a:t>5/23/2016</a:t>
+              <a:t>5/24/2016</a:t>
             </a:fld>
             <a:endParaRPr lang="en-US" dirty="0"/>
           </a:p>
@@ -5084,7 +5089,7 @@
             <a:fld id="{48A87A34-81AB-432B-8DAE-1953F412C126}" type="datetimeFigureOut">
               <a:rPr lang="en-US" smtClean="0"/>
               <a:pPr/>
-              <a:t>5/23/2016</a:t>
+              <a:t>5/24/2016</a:t>
             </a:fld>
             <a:endParaRPr lang="en-US" dirty="0"/>
           </a:p>
@@ -5615,7 +5620,7 @@
             <a:fld id="{48A87A34-81AB-432B-8DAE-1953F412C126}" type="datetimeFigureOut">
               <a:rPr lang="en-US" smtClean="0"/>
               <a:pPr/>
-              <a:t>5/23/2016</a:t>
+              <a:t>5/24/2016</a:t>
             </a:fld>
             <a:endParaRPr lang="en-US" dirty="0"/>
           </a:p>
@@ -6749,7 +6754,7 @@
         </p:blipFill>
         <p:spPr>
           <a:xfrm>
-            <a:off x="1752224" y="1969102"/>
+            <a:off x="1902872" y="1963487"/>
             <a:ext cx="3175172" cy="2381379"/>
           </a:xfrm>
           <a:prstGeom prst="rect">
@@ -7168,6 +7173,73 @@
             <a:r>
               <a:rPr lang="en-ZA" dirty="0"/>
               <a:t>Agile</a:t>
+            </a:r>
+          </a:p>
+        </p:txBody>
+      </p:sp>
+      <p:pic>
+        <p:nvPicPr>
+          <p:cNvPr id="3" name="Picture 2"/>
+          <p:cNvPicPr>
+            <a:picLocks noChangeAspect="1"/>
+          </p:cNvPicPr>
+          <p:nvPr/>
+        </p:nvPicPr>
+        <p:blipFill>
+          <a:blip r:embed="rId9"/>
+          <a:stretch>
+            <a:fillRect/>
+          </a:stretch>
+        </p:blipFill>
+        <p:spPr>
+          <a:xfrm>
+            <a:off x="1614616" y="214775"/>
+            <a:ext cx="1948610" cy="1948610"/>
+          </a:xfrm>
+          <a:prstGeom prst="rect">
+            <a:avLst/>
+          </a:prstGeom>
+        </p:spPr>
+      </p:pic>
+      <p:sp>
+        <p:nvSpPr>
+          <p:cNvPr id="20" name="Left-Right Arrow 19"/>
+          <p:cNvSpPr/>
+          <p:nvPr/>
+        </p:nvSpPr>
+        <p:spPr>
+          <a:xfrm rot="3440976">
+            <a:off x="2833948" y="2054716"/>
+            <a:ext cx="1551262" cy="459625"/>
+          </a:xfrm>
+          <a:prstGeom prst="leftRightArrow">
+            <a:avLst/>
+          </a:prstGeom>
+        </p:spPr>
+        <p:style>
+          <a:lnRef idx="2">
+            <a:schemeClr val="accent1">
+              <a:shade val="50000"/>
+            </a:schemeClr>
+          </a:lnRef>
+          <a:fillRef idx="1">
+            <a:schemeClr val="accent1"/>
+          </a:fillRef>
+          <a:effectRef idx="0">
+            <a:schemeClr val="accent1"/>
+          </a:effectRef>
+          <a:fontRef idx="minor">
+            <a:schemeClr val="lt1"/>
+          </a:fontRef>
+        </p:style>
+        <p:txBody>
+          <a:bodyPr rtlCol="0" anchor="ctr"/>
+          <a:lstStyle/>
+          <a:p>
+            <a:pPr algn="ctr"/>
+            <a:r>
+              <a:rPr lang="en-ZA" dirty="0"/>
+              <a:t>Notification</a:t>
             </a:r>
           </a:p>
         </p:txBody>
@@ -7363,6 +7435,41 @@
                                   </p:childTnLst>
                                 </p:cTn>
                               </p:par>
+                              <p:par>
+                                <p:cTn id="19" presetID="10" presetClass="entr" presetSubtype="0" fill="hold" grpId="0" nodeType="withEffect">
+                                  <p:stCondLst>
+                                    <p:cond delay="0"/>
+                                  </p:stCondLst>
+                                  <p:childTnLst>
+                                    <p:set>
+                                      <p:cBhvr>
+                                        <p:cTn id="20" dur="1" fill="hold">
+                                          <p:stCondLst>
+                                            <p:cond delay="0"/>
+                                          </p:stCondLst>
+                                        </p:cTn>
+                                        <p:tgtEl>
+                                          <p:spTgt spid="20"/>
+                                        </p:tgtEl>
+                                        <p:attrNameLst>
+                                          <p:attrName>style.visibility</p:attrName>
+                                        </p:attrNameLst>
+                                      </p:cBhvr>
+                                      <p:to>
+                                        <p:strVal val="visible"/>
+                                      </p:to>
+                                    </p:set>
+                                    <p:animEffect transition="in" filter="fade">
+                                      <p:cBhvr>
+                                        <p:cTn id="21" dur="500"/>
+                                        <p:tgtEl>
+                                          <p:spTgt spid="20"/>
+                                        </p:tgtEl>
+                                      </p:cBhvr>
+                                    </p:animEffect>
+                                  </p:childTnLst>
+                                </p:cTn>
+                              </p:par>
                             </p:childTnLst>
                           </p:cTn>
                         </p:par>
@@ -7370,26 +7477,26 @@
                     </p:cTn>
                   </p:par>
                   <p:par>
-                    <p:cTn id="19" fill="hold">
+                    <p:cTn id="22" fill="hold">
                       <p:stCondLst>
                         <p:cond delay="indefinite"/>
                       </p:stCondLst>
                       <p:childTnLst>
                         <p:par>
-                          <p:cTn id="20" fill="hold">
+                          <p:cTn id="23" fill="hold">
                             <p:stCondLst>
                               <p:cond delay="0"/>
                             </p:stCondLst>
                             <p:childTnLst>
                               <p:par>
-                                <p:cTn id="21" presetID="10" presetClass="entr" presetSubtype="0" fill="hold" grpId="0" nodeType="clickEffect">
+                                <p:cTn id="24" presetID="10" presetClass="entr" presetSubtype="0" fill="hold" grpId="0" nodeType="clickEffect">
                                   <p:stCondLst>
                                     <p:cond delay="0"/>
                                   </p:stCondLst>
                                   <p:childTnLst>
                                     <p:set>
                                       <p:cBhvr>
-                                        <p:cTn id="22" dur="1" fill="hold">
+                                        <p:cTn id="25" dur="1" fill="hold">
                                           <p:stCondLst>
                                             <p:cond delay="0"/>
                                           </p:stCondLst>
@@ -7407,7 +7514,7 @@
                                     </p:set>
                                     <p:animEffect transition="in" filter="fade">
                                       <p:cBhvr>
-                                        <p:cTn id="23" dur="500"/>
+                                        <p:cTn id="26" dur="500"/>
                                         <p:tgtEl>
                                           <p:spTgt spid="14"/>
                                         </p:tgtEl>
@@ -7417,14 +7524,14 @@
                                 </p:cTn>
                               </p:par>
                               <p:par>
-                                <p:cTn id="24" presetID="10" presetClass="entr" presetSubtype="0" fill="hold" nodeType="withEffect">
+                                <p:cTn id="27" presetID="10" presetClass="entr" presetSubtype="0" fill="hold" nodeType="withEffect">
                                   <p:stCondLst>
                                     <p:cond delay="0"/>
                                   </p:stCondLst>
                                   <p:childTnLst>
                                     <p:set>
                                       <p:cBhvr>
-                                        <p:cTn id="25" dur="1" fill="hold">
+                                        <p:cTn id="28" dur="1" fill="hold">
                                           <p:stCondLst>
                                             <p:cond delay="0"/>
                                           </p:stCondLst>
@@ -7442,7 +7549,7 @@
                                     </p:set>
                                     <p:animEffect transition="in" filter="fade">
                                       <p:cBhvr>
-                                        <p:cTn id="26" dur="500"/>
+                                        <p:cTn id="29" dur="500"/>
                                         <p:tgtEl>
                                           <p:spTgt spid="6"/>
                                         </p:tgtEl>
@@ -7458,26 +7565,26 @@
                     </p:cTn>
                   </p:par>
                   <p:par>
-                    <p:cTn id="27" fill="hold">
+                    <p:cTn id="30" fill="hold">
                       <p:stCondLst>
                         <p:cond delay="indefinite"/>
                       </p:stCondLst>
                       <p:childTnLst>
                         <p:par>
-                          <p:cTn id="28" fill="hold">
+                          <p:cTn id="31" fill="hold">
                             <p:stCondLst>
                               <p:cond delay="0"/>
                             </p:stCondLst>
                             <p:childTnLst>
                               <p:par>
-                                <p:cTn id="29" presetID="10" presetClass="entr" presetSubtype="0" fill="hold" grpId="0" nodeType="clickEffect">
+                                <p:cTn id="32" presetID="10" presetClass="entr" presetSubtype="0" fill="hold" grpId="0" nodeType="clickEffect">
                                   <p:stCondLst>
                                     <p:cond delay="0"/>
                                   </p:stCondLst>
                                   <p:childTnLst>
                                     <p:set>
                                       <p:cBhvr>
-                                        <p:cTn id="30" dur="1" fill="hold">
+                                        <p:cTn id="33" dur="1" fill="hold">
                                           <p:stCondLst>
                                             <p:cond delay="0"/>
                                           </p:stCondLst>
@@ -7495,7 +7602,7 @@
                                     </p:set>
                                     <p:animEffect transition="in" filter="fade">
                                       <p:cBhvr>
-                                        <p:cTn id="31" dur="500"/>
+                                        <p:cTn id="34" dur="500"/>
                                         <p:tgtEl>
                                           <p:spTgt spid="33"/>
                                         </p:tgtEl>
@@ -7511,26 +7618,26 @@
                     </p:cTn>
                   </p:par>
                   <p:par>
-                    <p:cTn id="32" fill="hold">
+                    <p:cTn id="35" fill="hold">
                       <p:stCondLst>
                         <p:cond delay="indefinite"/>
                       </p:stCondLst>
                       <p:childTnLst>
                         <p:par>
-                          <p:cTn id="33" fill="hold">
+                          <p:cTn id="36" fill="hold">
                             <p:stCondLst>
                               <p:cond delay="0"/>
                             </p:stCondLst>
                             <p:childTnLst>
                               <p:par>
-                                <p:cTn id="34" presetID="10" presetClass="entr" presetSubtype="0" fill="hold" grpId="0" nodeType="clickEffect">
+                                <p:cTn id="37" presetID="10" presetClass="entr" presetSubtype="0" fill="hold" grpId="0" nodeType="clickEffect">
                                   <p:stCondLst>
                                     <p:cond delay="0"/>
                                   </p:stCondLst>
                                   <p:childTnLst>
                                     <p:set>
                                       <p:cBhvr>
-                                        <p:cTn id="35" dur="1" fill="hold">
+                                        <p:cTn id="38" dur="1" fill="hold">
                                           <p:stCondLst>
                                             <p:cond delay="0"/>
                                           </p:stCondLst>
@@ -7548,7 +7655,7 @@
                                     </p:set>
                                     <p:animEffect transition="in" filter="fade">
                                       <p:cBhvr>
-                                        <p:cTn id="36" dur="500"/>
+                                        <p:cTn id="39" dur="500"/>
                                         <p:tgtEl>
                                           <p:spTgt spid="29"/>
                                         </p:tgtEl>
@@ -7558,14 +7665,14 @@
                                 </p:cTn>
                               </p:par>
                               <p:par>
-                                <p:cTn id="37" presetID="10" presetClass="entr" presetSubtype="0" fill="hold" nodeType="withEffect">
+                                <p:cTn id="40" presetID="10" presetClass="entr" presetSubtype="0" fill="hold" nodeType="withEffect">
                                   <p:stCondLst>
                                     <p:cond delay="0"/>
                                   </p:stCondLst>
                                   <p:childTnLst>
                                     <p:set>
                                       <p:cBhvr>
-                                        <p:cTn id="38" dur="1" fill="hold">
+                                        <p:cTn id="41" dur="1" fill="hold">
                                           <p:stCondLst>
                                             <p:cond delay="0"/>
                                           </p:stCondLst>
@@ -7583,7 +7690,7 @@
                                     </p:set>
                                     <p:animEffect transition="in" filter="fade">
                                       <p:cBhvr>
-                                        <p:cTn id="39" dur="500"/>
+                                        <p:cTn id="42" dur="500"/>
                                         <p:tgtEl>
                                           <p:spTgt spid="10"/>
                                         </p:tgtEl>
@@ -7599,26 +7706,26 @@
                     </p:cTn>
                   </p:par>
                   <p:par>
-                    <p:cTn id="40" fill="hold">
+                    <p:cTn id="43" fill="hold">
                       <p:stCondLst>
                         <p:cond delay="indefinite"/>
                       </p:stCondLst>
                       <p:childTnLst>
                         <p:par>
-                          <p:cTn id="41" fill="hold">
+                          <p:cTn id="44" fill="hold">
                             <p:stCondLst>
                               <p:cond delay="0"/>
                             </p:stCondLst>
                             <p:childTnLst>
                               <p:par>
-                                <p:cTn id="42" presetID="10" presetClass="entr" presetSubtype="0" fill="hold" grpId="0" nodeType="clickEffect">
+                                <p:cTn id="45" presetID="10" presetClass="entr" presetSubtype="0" fill="hold" grpId="0" nodeType="clickEffect">
                                   <p:stCondLst>
                                     <p:cond delay="0"/>
                                   </p:stCondLst>
                                   <p:childTnLst>
                                     <p:set>
                                       <p:cBhvr>
-                                        <p:cTn id="43" dur="1" fill="hold">
+                                        <p:cTn id="46" dur="1" fill="hold">
                                           <p:stCondLst>
                                             <p:cond delay="0"/>
                                           </p:stCondLst>
@@ -7636,7 +7743,7 @@
                                     </p:set>
                                     <p:animEffect transition="in" filter="fade">
                                       <p:cBhvr>
-                                        <p:cTn id="44" dur="500"/>
+                                        <p:cTn id="47" dur="500"/>
                                         <p:tgtEl>
                                           <p:spTgt spid="28"/>
                                         </p:tgtEl>
@@ -7652,26 +7759,26 @@
                     </p:cTn>
                   </p:par>
                   <p:par>
-                    <p:cTn id="45" fill="hold">
+                    <p:cTn id="48" fill="hold">
                       <p:stCondLst>
                         <p:cond delay="indefinite"/>
                       </p:stCondLst>
                       <p:childTnLst>
                         <p:par>
-                          <p:cTn id="46" fill="hold">
+                          <p:cTn id="49" fill="hold">
                             <p:stCondLst>
                               <p:cond delay="0"/>
                             </p:stCondLst>
                             <p:childTnLst>
                               <p:par>
-                                <p:cTn id="47" presetID="10" presetClass="entr" presetSubtype="0" fill="hold" grpId="0" nodeType="clickEffect">
+                                <p:cTn id="50" presetID="10" presetClass="entr" presetSubtype="0" fill="hold" grpId="0" nodeType="clickEffect">
                                   <p:stCondLst>
                                     <p:cond delay="0"/>
                                   </p:stCondLst>
                                   <p:childTnLst>
                                     <p:set>
                                       <p:cBhvr>
-                                        <p:cTn id="48" dur="1" fill="hold">
+                                        <p:cTn id="51" dur="1" fill="hold">
                                           <p:stCondLst>
                                             <p:cond delay="0"/>
                                           </p:stCondLst>
@@ -7689,7 +7796,7 @@
                                     </p:set>
                                     <p:animEffect transition="in" filter="fade">
                                       <p:cBhvr>
-                                        <p:cTn id="49" dur="500"/>
+                                        <p:cTn id="52" dur="500"/>
                                         <p:tgtEl>
                                           <p:spTgt spid="30"/>
                                         </p:tgtEl>
@@ -7699,14 +7806,14 @@
                                 </p:cTn>
                               </p:par>
                               <p:par>
-                                <p:cTn id="50" presetID="10" presetClass="entr" presetSubtype="0" fill="hold" grpId="0" nodeType="withEffect">
+                                <p:cTn id="53" presetID="10" presetClass="entr" presetSubtype="0" fill="hold" grpId="0" nodeType="withEffect">
                                   <p:stCondLst>
                                     <p:cond delay="0"/>
                                   </p:stCondLst>
                                   <p:childTnLst>
                                     <p:set>
                                       <p:cBhvr>
-                                        <p:cTn id="51" dur="1" fill="hold">
+                                        <p:cTn id="54" dur="1" fill="hold">
                                           <p:stCondLst>
                                             <p:cond delay="0"/>
                                           </p:stCondLst>
@@ -7724,7 +7831,7 @@
                                     </p:set>
                                     <p:animEffect transition="in" filter="fade">
                                       <p:cBhvr>
-                                        <p:cTn id="52" dur="500"/>
+                                        <p:cTn id="55" dur="500"/>
                                         <p:tgtEl>
                                           <p:spTgt spid="32"/>
                                         </p:tgtEl>
@@ -7734,14 +7841,14 @@
                                 </p:cTn>
                               </p:par>
                               <p:par>
-                                <p:cTn id="53" presetID="10" presetClass="entr" presetSubtype="0" fill="hold" nodeType="withEffect">
+                                <p:cTn id="56" presetID="10" presetClass="entr" presetSubtype="0" fill="hold" nodeType="withEffect">
                                   <p:stCondLst>
                                     <p:cond delay="0"/>
                                   </p:stCondLst>
                                   <p:childTnLst>
                                     <p:set>
                                       <p:cBhvr>
-                                        <p:cTn id="54" dur="1" fill="hold">
+                                        <p:cTn id="57" dur="1" fill="hold">
                                           <p:stCondLst>
                                             <p:cond delay="0"/>
                                           </p:stCondLst>
@@ -7759,7 +7866,7 @@
                                     </p:set>
                                     <p:animEffect transition="in" filter="fade">
                                       <p:cBhvr>
-                                        <p:cTn id="55" dur="500"/>
+                                        <p:cTn id="58" dur="500"/>
                                         <p:tgtEl>
                                           <p:spTgt spid="9"/>
                                         </p:tgtEl>
@@ -7775,26 +7882,26 @@
                     </p:cTn>
                   </p:par>
                   <p:par>
-                    <p:cTn id="56" fill="hold">
+                    <p:cTn id="59" fill="hold">
                       <p:stCondLst>
                         <p:cond delay="indefinite"/>
                       </p:stCondLst>
                       <p:childTnLst>
                         <p:par>
-                          <p:cTn id="57" fill="hold">
+                          <p:cTn id="60" fill="hold">
                             <p:stCondLst>
                               <p:cond delay="0"/>
                             </p:stCondLst>
                             <p:childTnLst>
                               <p:par>
-                                <p:cTn id="58" presetID="10" presetClass="entr" presetSubtype="0" fill="hold" grpId="0" nodeType="clickEffect">
+                                <p:cTn id="61" presetID="10" presetClass="entr" presetSubtype="0" fill="hold" grpId="0" nodeType="clickEffect">
                                   <p:stCondLst>
                                     <p:cond delay="0"/>
                                   </p:stCondLst>
                                   <p:childTnLst>
                                     <p:set>
                                       <p:cBhvr>
-                                        <p:cTn id="59" dur="1" fill="hold">
+                                        <p:cTn id="62" dur="1" fill="hold">
                                           <p:stCondLst>
                                             <p:cond delay="0"/>
                                           </p:stCondLst>
@@ -7812,7 +7919,7 @@
                                     </p:set>
                                     <p:animEffect transition="in" filter="fade">
                                       <p:cBhvr>
-                                        <p:cTn id="60" dur="500"/>
+                                        <p:cTn id="63" dur="500"/>
                                         <p:tgtEl>
                                           <p:spTgt spid="31"/>
                                         </p:tgtEl>
@@ -7858,6 +7965,7 @@
       <p:bldP spid="32" grpId="0" animBg="1"/>
       <p:bldP spid="33" grpId="0" animBg="1"/>
       <p:bldP spid="35" grpId="0" animBg="1"/>
+      <p:bldP spid="20" grpId="0" animBg="1"/>
     </p:bldLst>
   </p:timing>
 </p:sld>

</xml_diff>

<commit_message>
Added pros cons to presentation
</commit_message>
<xml_diff>
--- a/Documentation/Demo/Demo_01.pptx
+++ b/Documentation/Demo/Demo_01.pptx
@@ -8,6 +8,8 @@
     <p:sldId id="256" r:id="rId2"/>
     <p:sldId id="258" r:id="rId3"/>
     <p:sldId id="257" r:id="rId4"/>
+    <p:sldId id="259" r:id="rId5"/>
+    <p:sldId id="260" r:id="rId6"/>
   </p:sldIdLst>
   <p:sldSz cx="12192000" cy="6858000"/>
   <p:notesSz cx="6858000" cy="9144000"/>
@@ -616,7 +618,7 @@
           <a:p>
             <a:fld id="{48A87A34-81AB-432B-8DAE-1953F412C126}" type="datetimeFigureOut">
               <a:rPr lang="en-US" smtClean="0"/>
-              <a:t>5/24/2016</a:t>
+              <a:t>26-May-16</a:t>
             </a:fld>
             <a:endParaRPr lang="en-US" dirty="0"/>
           </a:p>
@@ -912,7 +914,7 @@
             <a:fld id="{48A87A34-81AB-432B-8DAE-1953F412C126}" type="datetimeFigureOut">
               <a:rPr lang="en-US" smtClean="0"/>
               <a:pPr/>
-              <a:t>5/24/2016</a:t>
+              <a:t>26-May-16</a:t>
             </a:fld>
             <a:endParaRPr lang="en-US" dirty="0"/>
           </a:p>
@@ -1162,7 +1164,7 @@
             <a:fld id="{48A87A34-81AB-432B-8DAE-1953F412C126}" type="datetimeFigureOut">
               <a:rPr lang="en-US" smtClean="0"/>
               <a:pPr/>
-              <a:t>5/24/2016</a:t>
+              <a:t>26-May-16</a:t>
             </a:fld>
             <a:endParaRPr lang="en-US" dirty="0"/>
           </a:p>
@@ -1704,7 +1706,7 @@
             <a:fld id="{48A87A34-81AB-432B-8DAE-1953F412C126}" type="datetimeFigureOut">
               <a:rPr lang="en-US" smtClean="0"/>
               <a:pPr/>
-              <a:t>5/24/2016</a:t>
+              <a:t>26-May-16</a:t>
             </a:fld>
             <a:endParaRPr lang="en-US" dirty="0"/>
           </a:p>
@@ -1954,7 +1956,7 @@
             <a:fld id="{48A87A34-81AB-432B-8DAE-1953F412C126}" type="datetimeFigureOut">
               <a:rPr lang="en-US" smtClean="0"/>
               <a:pPr/>
-              <a:t>5/24/2016</a:t>
+              <a:t>26-May-16</a:t>
             </a:fld>
             <a:endParaRPr lang="en-US" dirty="0"/>
           </a:p>
@@ -2488,7 +2490,7 @@
             <a:fld id="{48A87A34-81AB-432B-8DAE-1953F412C126}" type="datetimeFigureOut">
               <a:rPr lang="en-US" smtClean="0"/>
               <a:pPr/>
-              <a:t>5/24/2016</a:t>
+              <a:t>26-May-16</a:t>
             </a:fld>
             <a:endParaRPr lang="en-US" dirty="0"/>
           </a:p>
@@ -2787,7 +2789,7 @@
             <a:fld id="{48A87A34-81AB-432B-8DAE-1953F412C126}" type="datetimeFigureOut">
               <a:rPr lang="en-US" smtClean="0"/>
               <a:pPr/>
-              <a:t>5/24/2016</a:t>
+              <a:t>26-May-16</a:t>
             </a:fld>
             <a:endParaRPr lang="en-US" dirty="0"/>
           </a:p>
@@ -2962,7 +2964,7 @@
           <a:p>
             <a:fld id="{48A87A34-81AB-432B-8DAE-1953F412C126}" type="datetimeFigureOut">
               <a:rPr lang="en-US" smtClean="0"/>
-              <a:t>5/24/2016</a:t>
+              <a:t>26-May-16</a:t>
             </a:fld>
             <a:endParaRPr lang="en-US" dirty="0"/>
           </a:p>
@@ -3142,7 +3144,7 @@
           <a:p>
             <a:fld id="{48A87A34-81AB-432B-8DAE-1953F412C126}" type="datetimeFigureOut">
               <a:rPr lang="en-US" smtClean="0"/>
-              <a:t>5/24/2016</a:t>
+              <a:t>26-May-16</a:t>
             </a:fld>
             <a:endParaRPr lang="en-US" dirty="0"/>
           </a:p>
@@ -3312,7 +3314,7 @@
           <a:p>
             <a:fld id="{48A87A34-81AB-432B-8DAE-1953F412C126}" type="datetimeFigureOut">
               <a:rPr lang="en-US" smtClean="0"/>
-              <a:t>5/24/2016</a:t>
+              <a:t>26-May-16</a:t>
             </a:fld>
             <a:endParaRPr lang="en-US" dirty="0"/>
           </a:p>
@@ -3563,7 +3565,7 @@
           <a:p>
             <a:fld id="{48A87A34-81AB-432B-8DAE-1953F412C126}" type="datetimeFigureOut">
               <a:rPr lang="en-US" smtClean="0"/>
-              <a:t>5/24/2016</a:t>
+              <a:t>26-May-16</a:t>
             </a:fld>
             <a:endParaRPr lang="en-US" dirty="0"/>
           </a:p>
@@ -3860,7 +3862,7 @@
           <a:p>
             <a:fld id="{48A87A34-81AB-432B-8DAE-1953F412C126}" type="datetimeFigureOut">
               <a:rPr lang="en-US" smtClean="0"/>
-              <a:t>5/24/2016</a:t>
+              <a:t>26-May-16</a:t>
             </a:fld>
             <a:endParaRPr lang="en-US" dirty="0"/>
           </a:p>
@@ -4302,7 +4304,7 @@
           <a:p>
             <a:fld id="{48A87A34-81AB-432B-8DAE-1953F412C126}" type="datetimeFigureOut">
               <a:rPr lang="en-US" smtClean="0"/>
-              <a:t>5/24/2016</a:t>
+              <a:t>26-May-16</a:t>
             </a:fld>
             <a:endParaRPr lang="en-US" dirty="0"/>
           </a:p>
@@ -4420,7 +4422,7 @@
           <a:p>
             <a:fld id="{48A87A34-81AB-432B-8DAE-1953F412C126}" type="datetimeFigureOut">
               <a:rPr lang="en-US" smtClean="0"/>
-              <a:t>5/24/2016</a:t>
+              <a:t>26-May-16</a:t>
             </a:fld>
             <a:endParaRPr lang="en-US" dirty="0"/>
           </a:p>
@@ -4515,7 +4517,7 @@
           <a:p>
             <a:fld id="{48A87A34-81AB-432B-8DAE-1953F412C126}" type="datetimeFigureOut">
               <a:rPr lang="en-US" smtClean="0"/>
-              <a:t>5/24/2016</a:t>
+              <a:t>26-May-16</a:t>
             </a:fld>
             <a:endParaRPr lang="en-US" dirty="0"/>
           </a:p>
@@ -4798,7 +4800,7 @@
           <a:p>
             <a:fld id="{48A87A34-81AB-432B-8DAE-1953F412C126}" type="datetimeFigureOut">
               <a:rPr lang="en-US" smtClean="0"/>
-              <a:t>5/24/2016</a:t>
+              <a:t>26-May-16</a:t>
             </a:fld>
             <a:endParaRPr lang="en-US" dirty="0"/>
           </a:p>
@@ -5089,7 +5091,7 @@
             <a:fld id="{48A87A34-81AB-432B-8DAE-1953F412C126}" type="datetimeFigureOut">
               <a:rPr lang="en-US" smtClean="0"/>
               <a:pPr/>
-              <a:t>5/24/2016</a:t>
+              <a:t>26-May-16</a:t>
             </a:fld>
             <a:endParaRPr lang="en-US" dirty="0"/>
           </a:p>
@@ -5620,7 +5622,7 @@
             <a:fld id="{48A87A34-81AB-432B-8DAE-1953F412C126}" type="datetimeFigureOut">
               <a:rPr lang="en-US" smtClean="0"/>
               <a:pPr/>
-              <a:t>5/24/2016</a:t>
+              <a:t>26-May-16</a:t>
             </a:fld>
             <a:endParaRPr lang="en-US" dirty="0"/>
           </a:p>
@@ -6209,6 +6211,13 @@
   <p:transition spd="slow">
     <p:push dir="u"/>
   </p:transition>
+  <p:timing>
+    <p:tnLst>
+      <p:par>
+        <p:cTn id="1" dur="indefinite" restart="never" nodeType="tmRoot"/>
+      </p:par>
+    </p:tnLst>
+  </p:timing>
 </p:sld>
 </file>
 
@@ -7971,6 +7980,2092 @@
 </p:sld>
 </file>
 
+<file path=ppt/slides/slide4.xml><?xml version="1.0" encoding="utf-8"?>
+<p:sld xmlns:a="http://schemas.openxmlformats.org/drawingml/2006/main" xmlns:r="http://schemas.openxmlformats.org/officeDocument/2006/relationships" xmlns:p="http://schemas.openxmlformats.org/presentationml/2006/main">
+  <p:cSld>
+    <p:spTree>
+      <p:nvGrpSpPr>
+        <p:cNvPr id="1" name=""/>
+        <p:cNvGrpSpPr/>
+        <p:nvPr/>
+      </p:nvGrpSpPr>
+      <p:grpSpPr>
+        <a:xfrm>
+          <a:off x="0" y="0"/>
+          <a:ext cx="0" cy="0"/>
+          <a:chOff x="0" y="0"/>
+          <a:chExt cx="0" cy="0"/>
+        </a:xfrm>
+      </p:grpSpPr>
+      <p:sp>
+        <p:nvSpPr>
+          <p:cNvPr id="2" name="Title 1"/>
+          <p:cNvSpPr>
+            <a:spLocks noGrp="1"/>
+          </p:cNvSpPr>
+          <p:nvPr>
+            <p:ph type="title"/>
+          </p:nvPr>
+        </p:nvSpPr>
+        <p:spPr>
+          <a:xfrm>
+            <a:off x="1420515" y="393045"/>
+            <a:ext cx="10018713" cy="1752599"/>
+          </a:xfrm>
+        </p:spPr>
+        <p:txBody>
+          <a:bodyPr/>
+          <a:lstStyle/>
+          <a:p>
+            <a:r>
+              <a:rPr lang="en-US" dirty="0" err="1" smtClean="0"/>
+              <a:t>vs</a:t>
+            </a:r>
+            <a:r>
+              <a:rPr lang="en-US" dirty="0" smtClean="0"/>
+              <a:t> </a:t>
+            </a:r>
+            <a:endParaRPr lang="en-US" dirty="0"/>
+          </a:p>
+        </p:txBody>
+      </p:sp>
+      <p:pic>
+        <p:nvPicPr>
+          <p:cNvPr id="4" name="Picture 3"/>
+          <p:cNvPicPr>
+            <a:picLocks noChangeAspect="1"/>
+          </p:cNvPicPr>
+          <p:nvPr/>
+        </p:nvPicPr>
+        <p:blipFill>
+          <a:blip r:embed="rId2"/>
+          <a:stretch>
+            <a:fillRect/>
+          </a:stretch>
+        </p:blipFill>
+        <p:spPr>
+          <a:xfrm>
+            <a:off x="8336623" y="558162"/>
+            <a:ext cx="2349098" cy="1439030"/>
+          </a:xfrm>
+          <a:prstGeom prst="rect">
+            <a:avLst/>
+          </a:prstGeom>
+        </p:spPr>
+      </p:pic>
+      <p:pic>
+        <p:nvPicPr>
+          <p:cNvPr id="5" name="Picture 4"/>
+          <p:cNvPicPr>
+            <a:picLocks noChangeAspect="1"/>
+          </p:cNvPicPr>
+          <p:nvPr/>
+        </p:nvPicPr>
+        <p:blipFill>
+          <a:blip r:embed="rId3"/>
+          <a:stretch>
+            <a:fillRect/>
+          </a:stretch>
+        </p:blipFill>
+        <p:spPr>
+          <a:xfrm>
+            <a:off x="2462646" y="558162"/>
+            <a:ext cx="2906796" cy="1194574"/>
+          </a:xfrm>
+          <a:prstGeom prst="rect">
+            <a:avLst/>
+          </a:prstGeom>
+        </p:spPr>
+      </p:pic>
+      <p:sp>
+        <p:nvSpPr>
+          <p:cNvPr id="8" name="TextBox 7"/>
+          <p:cNvSpPr txBox="1"/>
+          <p:nvPr/>
+        </p:nvSpPr>
+        <p:spPr>
+          <a:xfrm>
+            <a:off x="8062315" y="2310761"/>
+            <a:ext cx="3108960" cy="4801314"/>
+          </a:xfrm>
+          <a:prstGeom prst="rect">
+            <a:avLst/>
+          </a:prstGeom>
+          <a:noFill/>
+        </p:spPr>
+        <p:txBody>
+          <a:bodyPr wrap="square" rtlCol="0">
+            <a:spAutoFit/>
+          </a:bodyPr>
+          <a:lstStyle/>
+          <a:p>
+            <a:pPr marL="285750" indent="-285750">
+              <a:buFont typeface="Arial" panose="020B0604020202020204" pitchFamily="34" charset="0"/>
+              <a:buChar char="•"/>
+            </a:pPr>
+            <a:r>
+              <a:rPr lang="en-US" dirty="0" smtClean="0"/>
+              <a:t>Open source</a:t>
+            </a:r>
+          </a:p>
+          <a:p>
+            <a:pPr marL="285750" indent="-285750">
+              <a:buFont typeface="Arial" panose="020B0604020202020204" pitchFamily="34" charset="0"/>
+              <a:buChar char="•"/>
+            </a:pPr>
+            <a:r>
+              <a:rPr lang="en-US" dirty="0" smtClean="0"/>
+              <a:t>Cross platform support</a:t>
+            </a:r>
+          </a:p>
+          <a:p>
+            <a:pPr marL="285750" indent="-285750">
+              <a:buFont typeface="Arial" panose="020B0604020202020204" pitchFamily="34" charset="0"/>
+              <a:buChar char="•"/>
+            </a:pPr>
+            <a:r>
+              <a:rPr lang="en-US" dirty="0" smtClean="0"/>
+              <a:t>Uses </a:t>
+            </a:r>
+            <a:r>
+              <a:rPr lang="en-US" dirty="0" err="1" smtClean="0"/>
+              <a:t>Javascript</a:t>
+            </a:r>
+            <a:r>
+              <a:rPr lang="en-US" dirty="0" smtClean="0"/>
+              <a:t> which is also platform independent </a:t>
+            </a:r>
+          </a:p>
+          <a:p>
+            <a:pPr marL="285750" indent="-285750">
+              <a:buFont typeface="Arial" panose="020B0604020202020204" pitchFamily="34" charset="0"/>
+              <a:buChar char="•"/>
+            </a:pPr>
+            <a:r>
+              <a:rPr lang="en-US" dirty="0" err="1" smtClean="0"/>
+              <a:t>Npm</a:t>
+            </a:r>
+            <a:r>
+              <a:rPr lang="en-US" dirty="0" smtClean="0"/>
+              <a:t> (Node package manager) is easy to use</a:t>
+            </a:r>
+          </a:p>
+          <a:p>
+            <a:pPr marL="285750" indent="-285750">
+              <a:buFont typeface="Arial" panose="020B0604020202020204" pitchFamily="34" charset="0"/>
+              <a:buChar char="•"/>
+            </a:pPr>
+            <a:r>
+              <a:rPr lang="en-US" dirty="0"/>
+              <a:t>Asynchronous event driven IO helps concurrent request handling</a:t>
+            </a:r>
+            <a:r>
+              <a:rPr lang="en-US" dirty="0" smtClean="0"/>
+              <a:t>.</a:t>
+            </a:r>
+          </a:p>
+          <a:p>
+            <a:pPr marL="285750" indent="-285750">
+              <a:buFont typeface="Arial" panose="020B0604020202020204" pitchFamily="34" charset="0"/>
+              <a:buChar char="•"/>
+            </a:pPr>
+            <a:r>
+              <a:rPr lang="en-US" dirty="0" smtClean="0"/>
+              <a:t>Dependency installation is quick and easy</a:t>
+            </a:r>
+          </a:p>
+          <a:p>
+            <a:pPr marL="285750" indent="-285750">
+              <a:buFont typeface="Arial" panose="020B0604020202020204" pitchFamily="34" charset="0"/>
+              <a:buChar char="•"/>
+            </a:pPr>
+            <a:r>
+              <a:rPr lang="en-US" dirty="0" err="1" smtClean="0"/>
+              <a:t>Heroku</a:t>
+            </a:r>
+            <a:r>
+              <a:rPr lang="en-US" dirty="0" smtClean="0"/>
+              <a:t> integration is a breeze</a:t>
+            </a:r>
+          </a:p>
+          <a:p>
+            <a:pPr marL="285750" indent="-285750">
+              <a:buFont typeface="Arial" panose="020B0604020202020204" pitchFamily="34" charset="0"/>
+              <a:buChar char="•"/>
+            </a:pPr>
+            <a:r>
+              <a:rPr lang="en-US" dirty="0" smtClean="0"/>
+              <a:t>Lightweight in terms of resource use</a:t>
+            </a:r>
+          </a:p>
+          <a:p>
+            <a:pPr marL="285750" indent="-285750">
+              <a:buFont typeface="Arial" panose="020B0604020202020204" pitchFamily="34" charset="0"/>
+              <a:buChar char="•"/>
+            </a:pPr>
+            <a:endParaRPr lang="en-US" dirty="0" smtClean="0"/>
+          </a:p>
+          <a:p>
+            <a:pPr marL="285750" indent="-285750">
+              <a:buFont typeface="Arial" panose="020B0604020202020204" pitchFamily="34" charset="0"/>
+              <a:buChar char="•"/>
+            </a:pPr>
+            <a:endParaRPr lang="en-US" dirty="0"/>
+          </a:p>
+        </p:txBody>
+      </p:sp>
+      <p:sp>
+        <p:nvSpPr>
+          <p:cNvPr id="9" name="TextBox 8"/>
+          <p:cNvSpPr txBox="1"/>
+          <p:nvPr/>
+        </p:nvSpPr>
+        <p:spPr>
+          <a:xfrm>
+            <a:off x="1950044" y="2443759"/>
+            <a:ext cx="3150920" cy="3970318"/>
+          </a:xfrm>
+          <a:prstGeom prst="rect">
+            <a:avLst/>
+          </a:prstGeom>
+          <a:noFill/>
+        </p:spPr>
+        <p:txBody>
+          <a:bodyPr wrap="square" rtlCol="0">
+            <a:spAutoFit/>
+          </a:bodyPr>
+          <a:lstStyle/>
+          <a:p>
+            <a:pPr marL="285750" indent="-285750">
+              <a:buFont typeface="Arial" panose="020B0604020202020204" pitchFamily="34" charset="0"/>
+              <a:buChar char="•"/>
+            </a:pPr>
+            <a:r>
+              <a:rPr lang="en-US" dirty="0" smtClean="0"/>
+              <a:t>Uses C# as backend language</a:t>
+            </a:r>
+          </a:p>
+          <a:p>
+            <a:pPr marL="285750" indent="-285750">
+              <a:buFont typeface="Arial" panose="020B0604020202020204" pitchFamily="34" charset="0"/>
+              <a:buChar char="•"/>
+            </a:pPr>
+            <a:r>
+              <a:rPr lang="en-US" dirty="0" smtClean="0"/>
+              <a:t>Runs primarily on Microsoft Windows</a:t>
+            </a:r>
+          </a:p>
+          <a:p>
+            <a:pPr marL="285750" indent="-285750">
+              <a:buFont typeface="Arial" panose="020B0604020202020204" pitchFamily="34" charset="0"/>
+              <a:buChar char="•"/>
+            </a:pPr>
+            <a:r>
+              <a:rPr lang="en-US" dirty="0" smtClean="0"/>
+              <a:t>Object orientated </a:t>
+            </a:r>
+          </a:p>
+          <a:p>
+            <a:pPr marL="285750" indent="-285750">
+              <a:buFont typeface="Arial" panose="020B0604020202020204" pitchFamily="34" charset="0"/>
+              <a:buChar char="•"/>
+            </a:pPr>
+            <a:r>
+              <a:rPr lang="en-US" dirty="0"/>
+              <a:t>G</a:t>
+            </a:r>
+            <a:r>
+              <a:rPr lang="en-US" dirty="0" smtClean="0"/>
+              <a:t>ood for CPU intense workloads</a:t>
+            </a:r>
+          </a:p>
+          <a:p>
+            <a:pPr marL="285750" indent="-285750">
+              <a:buFont typeface="Arial" panose="020B0604020202020204" pitchFamily="34" charset="0"/>
+              <a:buChar char="•"/>
+            </a:pPr>
+            <a:r>
+              <a:rPr lang="en-US" dirty="0" smtClean="0"/>
+              <a:t>Rapid Application Development</a:t>
+            </a:r>
+            <a:r>
+              <a:rPr lang="en-US" dirty="0"/>
+              <a:t> </a:t>
+            </a:r>
+            <a:r>
+              <a:rPr lang="en-US" dirty="0" smtClean="0"/>
+              <a:t>– Drag an drop options, generate HTML</a:t>
+            </a:r>
+          </a:p>
+          <a:p>
+            <a:pPr marL="285750" indent="-285750">
+              <a:buFont typeface="Arial" panose="020B0604020202020204" pitchFamily="34" charset="0"/>
+              <a:buChar char="•"/>
+            </a:pPr>
+            <a:r>
+              <a:rPr lang="en-US" dirty="0" smtClean="0"/>
+              <a:t>Visual studio is a powerful IDE</a:t>
+            </a:r>
+          </a:p>
+          <a:p>
+            <a:pPr marL="285750" indent="-285750">
+              <a:buFont typeface="Arial" panose="020B0604020202020204" pitchFamily="34" charset="0"/>
+              <a:buChar char="•"/>
+            </a:pPr>
+            <a:endParaRPr lang="en-US" dirty="0" smtClean="0"/>
+          </a:p>
+        </p:txBody>
+      </p:sp>
+      <p:sp>
+        <p:nvSpPr>
+          <p:cNvPr id="10" name="TextBox 9"/>
+          <p:cNvSpPr txBox="1"/>
+          <p:nvPr/>
+        </p:nvSpPr>
+        <p:spPr>
+          <a:xfrm>
+            <a:off x="3590978" y="2153567"/>
+            <a:ext cx="5677786" cy="369332"/>
+          </a:xfrm>
+          <a:prstGeom prst="rect">
+            <a:avLst/>
+          </a:prstGeom>
+          <a:noFill/>
+        </p:spPr>
+        <p:txBody>
+          <a:bodyPr wrap="square" rtlCol="0">
+            <a:spAutoFit/>
+          </a:bodyPr>
+          <a:lstStyle/>
+          <a:p>
+            <a:pPr algn="ctr"/>
+            <a:r>
+              <a:rPr lang="en-US" dirty="0" smtClean="0"/>
+              <a:t>Pros</a:t>
+            </a:r>
+            <a:endParaRPr lang="en-US" dirty="0"/>
+          </a:p>
+        </p:txBody>
+      </p:sp>
+    </p:spTree>
+    <p:extLst>
+      <p:ext uri="{BB962C8B-B14F-4D97-AF65-F5344CB8AC3E}">
+        <p14:creationId xmlns:p14="http://schemas.microsoft.com/office/powerpoint/2010/main" val="1724064310"/>
+      </p:ext>
+    </p:extLst>
+  </p:cSld>
+  <p:clrMapOvr>
+    <a:masterClrMapping/>
+  </p:clrMapOvr>
+  <p:timing>
+    <p:tnLst>
+      <p:par>
+        <p:cTn id="1" dur="indefinite" restart="never" nodeType="tmRoot">
+          <p:childTnLst>
+            <p:seq concurrent="1" nextAc="seek">
+              <p:cTn id="2" dur="indefinite" nodeType="mainSeq">
+                <p:childTnLst>
+                  <p:par>
+                    <p:cTn id="3" fill="hold">
+                      <p:stCondLst>
+                        <p:cond delay="indefinite"/>
+                      </p:stCondLst>
+                      <p:childTnLst>
+                        <p:par>
+                          <p:cTn id="4" fill="hold">
+                            <p:stCondLst>
+                              <p:cond delay="0"/>
+                            </p:stCondLst>
+                            <p:childTnLst>
+                              <p:par>
+                                <p:cTn id="5" presetID="10" presetClass="entr" presetSubtype="0" fill="hold" nodeType="clickEffect">
+                                  <p:stCondLst>
+                                    <p:cond delay="0"/>
+                                  </p:stCondLst>
+                                  <p:childTnLst>
+                                    <p:set>
+                                      <p:cBhvr>
+                                        <p:cTn id="6" dur="1" fill="hold">
+                                          <p:stCondLst>
+                                            <p:cond delay="0"/>
+                                          </p:stCondLst>
+                                        </p:cTn>
+                                        <p:tgtEl>
+                                          <p:spTgt spid="5"/>
+                                        </p:tgtEl>
+                                        <p:attrNameLst>
+                                          <p:attrName>style.visibility</p:attrName>
+                                        </p:attrNameLst>
+                                      </p:cBhvr>
+                                      <p:to>
+                                        <p:strVal val="visible"/>
+                                      </p:to>
+                                    </p:set>
+                                    <p:animEffect transition="in" filter="fade">
+                                      <p:cBhvr>
+                                        <p:cTn id="7" dur="500"/>
+                                        <p:tgtEl>
+                                          <p:spTgt spid="5"/>
+                                        </p:tgtEl>
+                                      </p:cBhvr>
+                                    </p:animEffect>
+                                  </p:childTnLst>
+                                </p:cTn>
+                              </p:par>
+                            </p:childTnLst>
+                          </p:cTn>
+                        </p:par>
+                      </p:childTnLst>
+                    </p:cTn>
+                  </p:par>
+                  <p:par>
+                    <p:cTn id="8" fill="hold">
+                      <p:stCondLst>
+                        <p:cond delay="indefinite"/>
+                      </p:stCondLst>
+                      <p:childTnLst>
+                        <p:par>
+                          <p:cTn id="9" fill="hold">
+                            <p:stCondLst>
+                              <p:cond delay="0"/>
+                            </p:stCondLst>
+                            <p:childTnLst>
+                              <p:par>
+                                <p:cTn id="10" presetID="1" presetClass="entr" presetSubtype="0" fill="hold" grpId="0" nodeType="clickEffect">
+                                  <p:stCondLst>
+                                    <p:cond delay="0"/>
+                                  </p:stCondLst>
+                                  <p:childTnLst>
+                                    <p:set>
+                                      <p:cBhvr>
+                                        <p:cTn id="11" dur="1" fill="hold">
+                                          <p:stCondLst>
+                                            <p:cond delay="0"/>
+                                          </p:stCondLst>
+                                        </p:cTn>
+                                        <p:tgtEl>
+                                          <p:spTgt spid="2"/>
+                                        </p:tgtEl>
+                                        <p:attrNameLst>
+                                          <p:attrName>style.visibility</p:attrName>
+                                        </p:attrNameLst>
+                                      </p:cBhvr>
+                                      <p:to>
+                                        <p:strVal val="visible"/>
+                                      </p:to>
+                                    </p:set>
+                                  </p:childTnLst>
+                                </p:cTn>
+                              </p:par>
+                            </p:childTnLst>
+                          </p:cTn>
+                        </p:par>
+                      </p:childTnLst>
+                    </p:cTn>
+                  </p:par>
+                  <p:par>
+                    <p:cTn id="12" fill="hold">
+                      <p:stCondLst>
+                        <p:cond delay="indefinite"/>
+                      </p:stCondLst>
+                      <p:childTnLst>
+                        <p:par>
+                          <p:cTn id="13" fill="hold">
+                            <p:stCondLst>
+                              <p:cond delay="0"/>
+                            </p:stCondLst>
+                            <p:childTnLst>
+                              <p:par>
+                                <p:cTn id="14" presetID="10" presetClass="entr" presetSubtype="0" fill="hold" nodeType="clickEffect">
+                                  <p:stCondLst>
+                                    <p:cond delay="0"/>
+                                  </p:stCondLst>
+                                  <p:childTnLst>
+                                    <p:set>
+                                      <p:cBhvr>
+                                        <p:cTn id="15" dur="1" fill="hold">
+                                          <p:stCondLst>
+                                            <p:cond delay="0"/>
+                                          </p:stCondLst>
+                                        </p:cTn>
+                                        <p:tgtEl>
+                                          <p:spTgt spid="4"/>
+                                        </p:tgtEl>
+                                        <p:attrNameLst>
+                                          <p:attrName>style.visibility</p:attrName>
+                                        </p:attrNameLst>
+                                      </p:cBhvr>
+                                      <p:to>
+                                        <p:strVal val="visible"/>
+                                      </p:to>
+                                    </p:set>
+                                    <p:animEffect transition="in" filter="fade">
+                                      <p:cBhvr>
+                                        <p:cTn id="16" dur="500"/>
+                                        <p:tgtEl>
+                                          <p:spTgt spid="4"/>
+                                        </p:tgtEl>
+                                      </p:cBhvr>
+                                    </p:animEffect>
+                                  </p:childTnLst>
+                                </p:cTn>
+                              </p:par>
+                            </p:childTnLst>
+                          </p:cTn>
+                        </p:par>
+                      </p:childTnLst>
+                    </p:cTn>
+                  </p:par>
+                  <p:par>
+                    <p:cTn id="17" fill="hold">
+                      <p:stCondLst>
+                        <p:cond delay="indefinite"/>
+                      </p:stCondLst>
+                      <p:childTnLst>
+                        <p:par>
+                          <p:cTn id="18" fill="hold">
+                            <p:stCondLst>
+                              <p:cond delay="0"/>
+                            </p:stCondLst>
+                            <p:childTnLst>
+                              <p:par>
+                                <p:cTn id="19" presetID="1" presetClass="entr" presetSubtype="0" fill="hold" grpId="0" nodeType="clickEffect">
+                                  <p:stCondLst>
+                                    <p:cond delay="0"/>
+                                  </p:stCondLst>
+                                  <p:childTnLst>
+                                    <p:set>
+                                      <p:cBhvr>
+                                        <p:cTn id="20" dur="1" fill="hold">
+                                          <p:stCondLst>
+                                            <p:cond delay="0"/>
+                                          </p:stCondLst>
+                                        </p:cTn>
+                                        <p:tgtEl>
+                                          <p:spTgt spid="10"/>
+                                        </p:tgtEl>
+                                        <p:attrNameLst>
+                                          <p:attrName>style.visibility</p:attrName>
+                                        </p:attrNameLst>
+                                      </p:cBhvr>
+                                      <p:to>
+                                        <p:strVal val="visible"/>
+                                      </p:to>
+                                    </p:set>
+                                  </p:childTnLst>
+                                </p:cTn>
+                              </p:par>
+                            </p:childTnLst>
+                          </p:cTn>
+                        </p:par>
+                      </p:childTnLst>
+                    </p:cTn>
+                  </p:par>
+                  <p:par>
+                    <p:cTn id="21" fill="hold">
+                      <p:stCondLst>
+                        <p:cond delay="indefinite"/>
+                      </p:stCondLst>
+                      <p:childTnLst>
+                        <p:par>
+                          <p:cTn id="22" fill="hold">
+                            <p:stCondLst>
+                              <p:cond delay="0"/>
+                            </p:stCondLst>
+                            <p:childTnLst>
+                              <p:par>
+                                <p:cTn id="23" presetID="1" presetClass="entr" presetSubtype="0" fill="hold" nodeType="clickEffect">
+                                  <p:stCondLst>
+                                    <p:cond delay="0"/>
+                                  </p:stCondLst>
+                                  <p:childTnLst>
+                                    <p:set>
+                                      <p:cBhvr>
+                                        <p:cTn id="24" dur="1" fill="hold">
+                                          <p:stCondLst>
+                                            <p:cond delay="0"/>
+                                          </p:stCondLst>
+                                        </p:cTn>
+                                        <p:tgtEl>
+                                          <p:spTgt spid="9">
+                                            <p:txEl>
+                                              <p:pRg st="0" end="0"/>
+                                            </p:txEl>
+                                          </p:spTgt>
+                                        </p:tgtEl>
+                                        <p:attrNameLst>
+                                          <p:attrName>style.visibility</p:attrName>
+                                        </p:attrNameLst>
+                                      </p:cBhvr>
+                                      <p:to>
+                                        <p:strVal val="visible"/>
+                                      </p:to>
+                                    </p:set>
+                                  </p:childTnLst>
+                                </p:cTn>
+                              </p:par>
+                            </p:childTnLst>
+                          </p:cTn>
+                        </p:par>
+                      </p:childTnLst>
+                    </p:cTn>
+                  </p:par>
+                  <p:par>
+                    <p:cTn id="25" fill="hold">
+                      <p:stCondLst>
+                        <p:cond delay="indefinite"/>
+                      </p:stCondLst>
+                      <p:childTnLst>
+                        <p:par>
+                          <p:cTn id="26" fill="hold">
+                            <p:stCondLst>
+                              <p:cond delay="0"/>
+                            </p:stCondLst>
+                            <p:childTnLst>
+                              <p:par>
+                                <p:cTn id="27" presetID="1" presetClass="entr" presetSubtype="0" fill="hold" nodeType="clickEffect">
+                                  <p:stCondLst>
+                                    <p:cond delay="0"/>
+                                  </p:stCondLst>
+                                  <p:childTnLst>
+                                    <p:set>
+                                      <p:cBhvr>
+                                        <p:cTn id="28" dur="1" fill="hold">
+                                          <p:stCondLst>
+                                            <p:cond delay="0"/>
+                                          </p:stCondLst>
+                                        </p:cTn>
+                                        <p:tgtEl>
+                                          <p:spTgt spid="9">
+                                            <p:txEl>
+                                              <p:pRg st="1" end="1"/>
+                                            </p:txEl>
+                                          </p:spTgt>
+                                        </p:tgtEl>
+                                        <p:attrNameLst>
+                                          <p:attrName>style.visibility</p:attrName>
+                                        </p:attrNameLst>
+                                      </p:cBhvr>
+                                      <p:to>
+                                        <p:strVal val="visible"/>
+                                      </p:to>
+                                    </p:set>
+                                  </p:childTnLst>
+                                </p:cTn>
+                              </p:par>
+                            </p:childTnLst>
+                          </p:cTn>
+                        </p:par>
+                      </p:childTnLst>
+                    </p:cTn>
+                  </p:par>
+                  <p:par>
+                    <p:cTn id="29" fill="hold">
+                      <p:stCondLst>
+                        <p:cond delay="indefinite"/>
+                      </p:stCondLst>
+                      <p:childTnLst>
+                        <p:par>
+                          <p:cTn id="30" fill="hold">
+                            <p:stCondLst>
+                              <p:cond delay="0"/>
+                            </p:stCondLst>
+                            <p:childTnLst>
+                              <p:par>
+                                <p:cTn id="31" presetID="1" presetClass="entr" presetSubtype="0" fill="hold" nodeType="clickEffect">
+                                  <p:stCondLst>
+                                    <p:cond delay="0"/>
+                                  </p:stCondLst>
+                                  <p:childTnLst>
+                                    <p:set>
+                                      <p:cBhvr>
+                                        <p:cTn id="32" dur="1" fill="hold">
+                                          <p:stCondLst>
+                                            <p:cond delay="0"/>
+                                          </p:stCondLst>
+                                        </p:cTn>
+                                        <p:tgtEl>
+                                          <p:spTgt spid="9">
+                                            <p:txEl>
+                                              <p:pRg st="2" end="2"/>
+                                            </p:txEl>
+                                          </p:spTgt>
+                                        </p:tgtEl>
+                                        <p:attrNameLst>
+                                          <p:attrName>style.visibility</p:attrName>
+                                        </p:attrNameLst>
+                                      </p:cBhvr>
+                                      <p:to>
+                                        <p:strVal val="visible"/>
+                                      </p:to>
+                                    </p:set>
+                                  </p:childTnLst>
+                                </p:cTn>
+                              </p:par>
+                            </p:childTnLst>
+                          </p:cTn>
+                        </p:par>
+                      </p:childTnLst>
+                    </p:cTn>
+                  </p:par>
+                  <p:par>
+                    <p:cTn id="33" fill="hold">
+                      <p:stCondLst>
+                        <p:cond delay="indefinite"/>
+                      </p:stCondLst>
+                      <p:childTnLst>
+                        <p:par>
+                          <p:cTn id="34" fill="hold">
+                            <p:stCondLst>
+                              <p:cond delay="0"/>
+                            </p:stCondLst>
+                            <p:childTnLst>
+                              <p:par>
+                                <p:cTn id="35" presetID="1" presetClass="entr" presetSubtype="0" fill="hold" nodeType="clickEffect">
+                                  <p:stCondLst>
+                                    <p:cond delay="0"/>
+                                  </p:stCondLst>
+                                  <p:childTnLst>
+                                    <p:set>
+                                      <p:cBhvr>
+                                        <p:cTn id="36" dur="1" fill="hold">
+                                          <p:stCondLst>
+                                            <p:cond delay="0"/>
+                                          </p:stCondLst>
+                                        </p:cTn>
+                                        <p:tgtEl>
+                                          <p:spTgt spid="9">
+                                            <p:txEl>
+                                              <p:pRg st="3" end="3"/>
+                                            </p:txEl>
+                                          </p:spTgt>
+                                        </p:tgtEl>
+                                        <p:attrNameLst>
+                                          <p:attrName>style.visibility</p:attrName>
+                                        </p:attrNameLst>
+                                      </p:cBhvr>
+                                      <p:to>
+                                        <p:strVal val="visible"/>
+                                      </p:to>
+                                    </p:set>
+                                  </p:childTnLst>
+                                </p:cTn>
+                              </p:par>
+                            </p:childTnLst>
+                          </p:cTn>
+                        </p:par>
+                      </p:childTnLst>
+                    </p:cTn>
+                  </p:par>
+                  <p:par>
+                    <p:cTn id="37" fill="hold">
+                      <p:stCondLst>
+                        <p:cond delay="indefinite"/>
+                      </p:stCondLst>
+                      <p:childTnLst>
+                        <p:par>
+                          <p:cTn id="38" fill="hold">
+                            <p:stCondLst>
+                              <p:cond delay="0"/>
+                            </p:stCondLst>
+                            <p:childTnLst>
+                              <p:par>
+                                <p:cTn id="39" presetID="1" presetClass="entr" presetSubtype="0" fill="hold" nodeType="clickEffect">
+                                  <p:stCondLst>
+                                    <p:cond delay="0"/>
+                                  </p:stCondLst>
+                                  <p:childTnLst>
+                                    <p:set>
+                                      <p:cBhvr>
+                                        <p:cTn id="40" dur="1" fill="hold">
+                                          <p:stCondLst>
+                                            <p:cond delay="0"/>
+                                          </p:stCondLst>
+                                        </p:cTn>
+                                        <p:tgtEl>
+                                          <p:spTgt spid="9">
+                                            <p:txEl>
+                                              <p:pRg st="4" end="4"/>
+                                            </p:txEl>
+                                          </p:spTgt>
+                                        </p:tgtEl>
+                                        <p:attrNameLst>
+                                          <p:attrName>style.visibility</p:attrName>
+                                        </p:attrNameLst>
+                                      </p:cBhvr>
+                                      <p:to>
+                                        <p:strVal val="visible"/>
+                                      </p:to>
+                                    </p:set>
+                                  </p:childTnLst>
+                                </p:cTn>
+                              </p:par>
+                            </p:childTnLst>
+                          </p:cTn>
+                        </p:par>
+                      </p:childTnLst>
+                    </p:cTn>
+                  </p:par>
+                  <p:par>
+                    <p:cTn id="41" fill="hold">
+                      <p:stCondLst>
+                        <p:cond delay="indefinite"/>
+                      </p:stCondLst>
+                      <p:childTnLst>
+                        <p:par>
+                          <p:cTn id="42" fill="hold">
+                            <p:stCondLst>
+                              <p:cond delay="0"/>
+                            </p:stCondLst>
+                            <p:childTnLst>
+                              <p:par>
+                                <p:cTn id="43" presetID="1" presetClass="entr" presetSubtype="0" fill="hold" nodeType="clickEffect">
+                                  <p:stCondLst>
+                                    <p:cond delay="0"/>
+                                  </p:stCondLst>
+                                  <p:childTnLst>
+                                    <p:set>
+                                      <p:cBhvr>
+                                        <p:cTn id="44" dur="1" fill="hold">
+                                          <p:stCondLst>
+                                            <p:cond delay="0"/>
+                                          </p:stCondLst>
+                                        </p:cTn>
+                                        <p:tgtEl>
+                                          <p:spTgt spid="9">
+                                            <p:txEl>
+                                              <p:pRg st="5" end="5"/>
+                                            </p:txEl>
+                                          </p:spTgt>
+                                        </p:tgtEl>
+                                        <p:attrNameLst>
+                                          <p:attrName>style.visibility</p:attrName>
+                                        </p:attrNameLst>
+                                      </p:cBhvr>
+                                      <p:to>
+                                        <p:strVal val="visible"/>
+                                      </p:to>
+                                    </p:set>
+                                  </p:childTnLst>
+                                </p:cTn>
+                              </p:par>
+                            </p:childTnLst>
+                          </p:cTn>
+                        </p:par>
+                      </p:childTnLst>
+                    </p:cTn>
+                  </p:par>
+                  <p:par>
+                    <p:cTn id="45" fill="hold">
+                      <p:stCondLst>
+                        <p:cond delay="indefinite"/>
+                      </p:stCondLst>
+                      <p:childTnLst>
+                        <p:par>
+                          <p:cTn id="46" fill="hold">
+                            <p:stCondLst>
+                              <p:cond delay="0"/>
+                            </p:stCondLst>
+                            <p:childTnLst>
+                              <p:par>
+                                <p:cTn id="47" presetID="1" presetClass="entr" presetSubtype="0" fill="hold" nodeType="clickEffect">
+                                  <p:stCondLst>
+                                    <p:cond delay="0"/>
+                                  </p:stCondLst>
+                                  <p:childTnLst>
+                                    <p:set>
+                                      <p:cBhvr>
+                                        <p:cTn id="48" dur="1" fill="hold">
+                                          <p:stCondLst>
+                                            <p:cond delay="0"/>
+                                          </p:stCondLst>
+                                        </p:cTn>
+                                        <p:tgtEl>
+                                          <p:spTgt spid="8">
+                                            <p:txEl>
+                                              <p:pRg st="0" end="0"/>
+                                            </p:txEl>
+                                          </p:spTgt>
+                                        </p:tgtEl>
+                                        <p:attrNameLst>
+                                          <p:attrName>style.visibility</p:attrName>
+                                        </p:attrNameLst>
+                                      </p:cBhvr>
+                                      <p:to>
+                                        <p:strVal val="visible"/>
+                                      </p:to>
+                                    </p:set>
+                                  </p:childTnLst>
+                                </p:cTn>
+                              </p:par>
+                            </p:childTnLst>
+                          </p:cTn>
+                        </p:par>
+                      </p:childTnLst>
+                    </p:cTn>
+                  </p:par>
+                  <p:par>
+                    <p:cTn id="49" fill="hold">
+                      <p:stCondLst>
+                        <p:cond delay="indefinite"/>
+                      </p:stCondLst>
+                      <p:childTnLst>
+                        <p:par>
+                          <p:cTn id="50" fill="hold">
+                            <p:stCondLst>
+                              <p:cond delay="0"/>
+                            </p:stCondLst>
+                            <p:childTnLst>
+                              <p:par>
+                                <p:cTn id="51" presetID="1" presetClass="entr" presetSubtype="0" fill="hold" nodeType="clickEffect">
+                                  <p:stCondLst>
+                                    <p:cond delay="0"/>
+                                  </p:stCondLst>
+                                  <p:childTnLst>
+                                    <p:set>
+                                      <p:cBhvr>
+                                        <p:cTn id="52" dur="1" fill="hold">
+                                          <p:stCondLst>
+                                            <p:cond delay="0"/>
+                                          </p:stCondLst>
+                                        </p:cTn>
+                                        <p:tgtEl>
+                                          <p:spTgt spid="8">
+                                            <p:txEl>
+                                              <p:pRg st="1" end="1"/>
+                                            </p:txEl>
+                                          </p:spTgt>
+                                        </p:tgtEl>
+                                        <p:attrNameLst>
+                                          <p:attrName>style.visibility</p:attrName>
+                                        </p:attrNameLst>
+                                      </p:cBhvr>
+                                      <p:to>
+                                        <p:strVal val="visible"/>
+                                      </p:to>
+                                    </p:set>
+                                  </p:childTnLst>
+                                </p:cTn>
+                              </p:par>
+                            </p:childTnLst>
+                          </p:cTn>
+                        </p:par>
+                      </p:childTnLst>
+                    </p:cTn>
+                  </p:par>
+                  <p:par>
+                    <p:cTn id="53" fill="hold">
+                      <p:stCondLst>
+                        <p:cond delay="indefinite"/>
+                      </p:stCondLst>
+                      <p:childTnLst>
+                        <p:par>
+                          <p:cTn id="54" fill="hold">
+                            <p:stCondLst>
+                              <p:cond delay="0"/>
+                            </p:stCondLst>
+                            <p:childTnLst>
+                              <p:par>
+                                <p:cTn id="55" presetID="1" presetClass="entr" presetSubtype="0" fill="hold" nodeType="clickEffect">
+                                  <p:stCondLst>
+                                    <p:cond delay="0"/>
+                                  </p:stCondLst>
+                                  <p:childTnLst>
+                                    <p:set>
+                                      <p:cBhvr>
+                                        <p:cTn id="56" dur="1" fill="hold">
+                                          <p:stCondLst>
+                                            <p:cond delay="0"/>
+                                          </p:stCondLst>
+                                        </p:cTn>
+                                        <p:tgtEl>
+                                          <p:spTgt spid="8">
+                                            <p:txEl>
+                                              <p:pRg st="2" end="2"/>
+                                            </p:txEl>
+                                          </p:spTgt>
+                                        </p:tgtEl>
+                                        <p:attrNameLst>
+                                          <p:attrName>style.visibility</p:attrName>
+                                        </p:attrNameLst>
+                                      </p:cBhvr>
+                                      <p:to>
+                                        <p:strVal val="visible"/>
+                                      </p:to>
+                                    </p:set>
+                                  </p:childTnLst>
+                                </p:cTn>
+                              </p:par>
+                            </p:childTnLst>
+                          </p:cTn>
+                        </p:par>
+                      </p:childTnLst>
+                    </p:cTn>
+                  </p:par>
+                  <p:par>
+                    <p:cTn id="57" fill="hold">
+                      <p:stCondLst>
+                        <p:cond delay="indefinite"/>
+                      </p:stCondLst>
+                      <p:childTnLst>
+                        <p:par>
+                          <p:cTn id="58" fill="hold">
+                            <p:stCondLst>
+                              <p:cond delay="0"/>
+                            </p:stCondLst>
+                            <p:childTnLst>
+                              <p:par>
+                                <p:cTn id="59" presetID="1" presetClass="entr" presetSubtype="0" fill="hold" nodeType="clickEffect">
+                                  <p:stCondLst>
+                                    <p:cond delay="0"/>
+                                  </p:stCondLst>
+                                  <p:childTnLst>
+                                    <p:set>
+                                      <p:cBhvr>
+                                        <p:cTn id="60" dur="1" fill="hold">
+                                          <p:stCondLst>
+                                            <p:cond delay="0"/>
+                                          </p:stCondLst>
+                                        </p:cTn>
+                                        <p:tgtEl>
+                                          <p:spTgt spid="8">
+                                            <p:txEl>
+                                              <p:pRg st="3" end="3"/>
+                                            </p:txEl>
+                                          </p:spTgt>
+                                        </p:tgtEl>
+                                        <p:attrNameLst>
+                                          <p:attrName>style.visibility</p:attrName>
+                                        </p:attrNameLst>
+                                      </p:cBhvr>
+                                      <p:to>
+                                        <p:strVal val="visible"/>
+                                      </p:to>
+                                    </p:set>
+                                  </p:childTnLst>
+                                </p:cTn>
+                              </p:par>
+                            </p:childTnLst>
+                          </p:cTn>
+                        </p:par>
+                      </p:childTnLst>
+                    </p:cTn>
+                  </p:par>
+                  <p:par>
+                    <p:cTn id="61" fill="hold">
+                      <p:stCondLst>
+                        <p:cond delay="indefinite"/>
+                      </p:stCondLst>
+                      <p:childTnLst>
+                        <p:par>
+                          <p:cTn id="62" fill="hold">
+                            <p:stCondLst>
+                              <p:cond delay="0"/>
+                            </p:stCondLst>
+                            <p:childTnLst>
+                              <p:par>
+                                <p:cTn id="63" presetID="1" presetClass="entr" presetSubtype="0" fill="hold" nodeType="clickEffect">
+                                  <p:stCondLst>
+                                    <p:cond delay="0"/>
+                                  </p:stCondLst>
+                                  <p:childTnLst>
+                                    <p:set>
+                                      <p:cBhvr>
+                                        <p:cTn id="64" dur="1" fill="hold">
+                                          <p:stCondLst>
+                                            <p:cond delay="0"/>
+                                          </p:stCondLst>
+                                        </p:cTn>
+                                        <p:tgtEl>
+                                          <p:spTgt spid="8">
+                                            <p:txEl>
+                                              <p:pRg st="4" end="4"/>
+                                            </p:txEl>
+                                          </p:spTgt>
+                                        </p:tgtEl>
+                                        <p:attrNameLst>
+                                          <p:attrName>style.visibility</p:attrName>
+                                        </p:attrNameLst>
+                                      </p:cBhvr>
+                                      <p:to>
+                                        <p:strVal val="visible"/>
+                                      </p:to>
+                                    </p:set>
+                                  </p:childTnLst>
+                                </p:cTn>
+                              </p:par>
+                            </p:childTnLst>
+                          </p:cTn>
+                        </p:par>
+                      </p:childTnLst>
+                    </p:cTn>
+                  </p:par>
+                  <p:par>
+                    <p:cTn id="65" fill="hold">
+                      <p:stCondLst>
+                        <p:cond delay="indefinite"/>
+                      </p:stCondLst>
+                      <p:childTnLst>
+                        <p:par>
+                          <p:cTn id="66" fill="hold">
+                            <p:stCondLst>
+                              <p:cond delay="0"/>
+                            </p:stCondLst>
+                            <p:childTnLst>
+                              <p:par>
+                                <p:cTn id="67" presetID="1" presetClass="entr" presetSubtype="0" fill="hold" nodeType="clickEffect">
+                                  <p:stCondLst>
+                                    <p:cond delay="0"/>
+                                  </p:stCondLst>
+                                  <p:childTnLst>
+                                    <p:set>
+                                      <p:cBhvr>
+                                        <p:cTn id="68" dur="1" fill="hold">
+                                          <p:stCondLst>
+                                            <p:cond delay="0"/>
+                                          </p:stCondLst>
+                                        </p:cTn>
+                                        <p:tgtEl>
+                                          <p:spTgt spid="8">
+                                            <p:txEl>
+                                              <p:pRg st="5" end="5"/>
+                                            </p:txEl>
+                                          </p:spTgt>
+                                        </p:tgtEl>
+                                        <p:attrNameLst>
+                                          <p:attrName>style.visibility</p:attrName>
+                                        </p:attrNameLst>
+                                      </p:cBhvr>
+                                      <p:to>
+                                        <p:strVal val="visible"/>
+                                      </p:to>
+                                    </p:set>
+                                  </p:childTnLst>
+                                </p:cTn>
+                              </p:par>
+                            </p:childTnLst>
+                          </p:cTn>
+                        </p:par>
+                      </p:childTnLst>
+                    </p:cTn>
+                  </p:par>
+                  <p:par>
+                    <p:cTn id="69" fill="hold">
+                      <p:stCondLst>
+                        <p:cond delay="indefinite"/>
+                      </p:stCondLst>
+                      <p:childTnLst>
+                        <p:par>
+                          <p:cTn id="70" fill="hold">
+                            <p:stCondLst>
+                              <p:cond delay="0"/>
+                            </p:stCondLst>
+                            <p:childTnLst>
+                              <p:par>
+                                <p:cTn id="71" presetID="1" presetClass="entr" presetSubtype="0" fill="hold" nodeType="clickEffect">
+                                  <p:stCondLst>
+                                    <p:cond delay="0"/>
+                                  </p:stCondLst>
+                                  <p:childTnLst>
+                                    <p:set>
+                                      <p:cBhvr>
+                                        <p:cTn id="72" dur="1" fill="hold">
+                                          <p:stCondLst>
+                                            <p:cond delay="0"/>
+                                          </p:stCondLst>
+                                        </p:cTn>
+                                        <p:tgtEl>
+                                          <p:spTgt spid="8">
+                                            <p:txEl>
+                                              <p:pRg st="6" end="6"/>
+                                            </p:txEl>
+                                          </p:spTgt>
+                                        </p:tgtEl>
+                                        <p:attrNameLst>
+                                          <p:attrName>style.visibility</p:attrName>
+                                        </p:attrNameLst>
+                                      </p:cBhvr>
+                                      <p:to>
+                                        <p:strVal val="visible"/>
+                                      </p:to>
+                                    </p:set>
+                                  </p:childTnLst>
+                                </p:cTn>
+                              </p:par>
+                            </p:childTnLst>
+                          </p:cTn>
+                        </p:par>
+                      </p:childTnLst>
+                    </p:cTn>
+                  </p:par>
+                  <p:par>
+                    <p:cTn id="73" fill="hold">
+                      <p:stCondLst>
+                        <p:cond delay="indefinite"/>
+                      </p:stCondLst>
+                      <p:childTnLst>
+                        <p:par>
+                          <p:cTn id="74" fill="hold">
+                            <p:stCondLst>
+                              <p:cond delay="0"/>
+                            </p:stCondLst>
+                            <p:childTnLst>
+                              <p:par>
+                                <p:cTn id="75" presetID="1" presetClass="entr" presetSubtype="0" fill="hold" nodeType="clickEffect">
+                                  <p:stCondLst>
+                                    <p:cond delay="0"/>
+                                  </p:stCondLst>
+                                  <p:childTnLst>
+                                    <p:set>
+                                      <p:cBhvr>
+                                        <p:cTn id="76" dur="1" fill="hold">
+                                          <p:stCondLst>
+                                            <p:cond delay="0"/>
+                                          </p:stCondLst>
+                                        </p:cTn>
+                                        <p:tgtEl>
+                                          <p:spTgt spid="8">
+                                            <p:txEl>
+                                              <p:pRg st="7" end="7"/>
+                                            </p:txEl>
+                                          </p:spTgt>
+                                        </p:tgtEl>
+                                        <p:attrNameLst>
+                                          <p:attrName>style.visibility</p:attrName>
+                                        </p:attrNameLst>
+                                      </p:cBhvr>
+                                      <p:to>
+                                        <p:strVal val="visible"/>
+                                      </p:to>
+                                    </p:set>
+                                  </p:childTnLst>
+                                </p:cTn>
+                              </p:par>
+                            </p:childTnLst>
+                          </p:cTn>
+                        </p:par>
+                      </p:childTnLst>
+                    </p:cTn>
+                  </p:par>
+                </p:childTnLst>
+              </p:cTn>
+              <p:prevCondLst>
+                <p:cond evt="onPrev" delay="0">
+                  <p:tgtEl>
+                    <p:sldTgt/>
+                  </p:tgtEl>
+                </p:cond>
+              </p:prevCondLst>
+              <p:nextCondLst>
+                <p:cond evt="onNext" delay="0">
+                  <p:tgtEl>
+                    <p:sldTgt/>
+                  </p:tgtEl>
+                </p:cond>
+              </p:nextCondLst>
+            </p:seq>
+          </p:childTnLst>
+        </p:cTn>
+      </p:par>
+    </p:tnLst>
+    <p:bldLst>
+      <p:bldP spid="2" grpId="0"/>
+      <p:bldP spid="10" grpId="0"/>
+    </p:bldLst>
+  </p:timing>
+</p:sld>
+</file>
+
+<file path=ppt/slides/slide5.xml><?xml version="1.0" encoding="utf-8"?>
+<p:sld xmlns:a="http://schemas.openxmlformats.org/drawingml/2006/main" xmlns:r="http://schemas.openxmlformats.org/officeDocument/2006/relationships" xmlns:p="http://schemas.openxmlformats.org/presentationml/2006/main">
+  <p:cSld>
+    <p:spTree>
+      <p:nvGrpSpPr>
+        <p:cNvPr id="1" name=""/>
+        <p:cNvGrpSpPr/>
+        <p:nvPr/>
+      </p:nvGrpSpPr>
+      <p:grpSpPr>
+        <a:xfrm>
+          <a:off x="0" y="0"/>
+          <a:ext cx="0" cy="0"/>
+          <a:chOff x="0" y="0"/>
+          <a:chExt cx="0" cy="0"/>
+        </a:xfrm>
+      </p:grpSpPr>
+      <p:sp>
+        <p:nvSpPr>
+          <p:cNvPr id="7" name="TextBox 6"/>
+          <p:cNvSpPr txBox="1"/>
+          <p:nvPr/>
+        </p:nvSpPr>
+        <p:spPr>
+          <a:xfrm>
+            <a:off x="7956692" y="2659231"/>
+            <a:ext cx="3108960" cy="3693319"/>
+          </a:xfrm>
+          <a:prstGeom prst="rect">
+            <a:avLst/>
+          </a:prstGeom>
+          <a:noFill/>
+        </p:spPr>
+        <p:txBody>
+          <a:bodyPr wrap="square" rtlCol="0">
+            <a:spAutoFit/>
+          </a:bodyPr>
+          <a:lstStyle/>
+          <a:p>
+            <a:pPr marL="285750" indent="-285750">
+              <a:buFont typeface="Arial" panose="020B0604020202020204" pitchFamily="34" charset="0"/>
+              <a:buChar char="•"/>
+            </a:pPr>
+            <a:r>
+              <a:rPr lang="en-US" dirty="0" smtClean="0"/>
+              <a:t>Not object-orientated </a:t>
+            </a:r>
+          </a:p>
+          <a:p>
+            <a:pPr marL="285750" indent="-285750">
+              <a:buFont typeface="Arial" panose="020B0604020202020204" pitchFamily="34" charset="0"/>
+              <a:buChar char="•"/>
+            </a:pPr>
+            <a:r>
+              <a:rPr lang="en-US" dirty="0" smtClean="0"/>
+              <a:t>Not intended for CPU- intensive code, focuses on </a:t>
+            </a:r>
+            <a:r>
+              <a:rPr lang="en-US" dirty="0"/>
+              <a:t>event driven </a:t>
+            </a:r>
+            <a:r>
+              <a:rPr lang="en-US" dirty="0" smtClean="0"/>
+              <a:t>IO</a:t>
+            </a:r>
+          </a:p>
+          <a:p>
+            <a:pPr marL="285750" indent="-285750">
+              <a:buFont typeface="Arial" panose="020B0604020202020204" pitchFamily="34" charset="0"/>
+              <a:buChar char="•"/>
+            </a:pPr>
+            <a:r>
+              <a:rPr lang="en-US" dirty="0" smtClean="0"/>
+              <a:t>External libraries are needed for common features such ORM</a:t>
+            </a:r>
+          </a:p>
+          <a:p>
+            <a:pPr marL="285750" indent="-285750">
+              <a:buFont typeface="Arial" panose="020B0604020202020204" pitchFamily="34" charset="0"/>
+              <a:buChar char="•"/>
+            </a:pPr>
+            <a:r>
+              <a:rPr lang="en-US" dirty="0" smtClean="0"/>
+              <a:t>Does not support pure multithreading but rather event driven </a:t>
+            </a:r>
+            <a:r>
+              <a:rPr lang="en-US" dirty="0"/>
+              <a:t>IO </a:t>
+            </a:r>
+            <a:r>
+              <a:rPr lang="en-US" dirty="0" smtClean="0"/>
+              <a:t>by means of callbacks</a:t>
+            </a:r>
+          </a:p>
+          <a:p>
+            <a:pPr marL="285750" indent="-285750">
+              <a:buFont typeface="Arial" panose="020B0604020202020204" pitchFamily="34" charset="0"/>
+              <a:buChar char="•"/>
+            </a:pPr>
+            <a:endParaRPr lang="en-US" dirty="0" smtClean="0"/>
+          </a:p>
+          <a:p>
+            <a:pPr marL="285750" indent="-285750">
+              <a:buFont typeface="Arial" panose="020B0604020202020204" pitchFamily="34" charset="0"/>
+              <a:buChar char="•"/>
+            </a:pPr>
+            <a:endParaRPr lang="en-US" dirty="0"/>
+          </a:p>
+        </p:txBody>
+      </p:sp>
+      <p:sp>
+        <p:nvSpPr>
+          <p:cNvPr id="8" name="TextBox 7"/>
+          <p:cNvSpPr txBox="1"/>
+          <p:nvPr/>
+        </p:nvSpPr>
+        <p:spPr>
+          <a:xfrm>
+            <a:off x="1795061" y="2659231"/>
+            <a:ext cx="3150920" cy="3416320"/>
+          </a:xfrm>
+          <a:prstGeom prst="rect">
+            <a:avLst/>
+          </a:prstGeom>
+          <a:noFill/>
+        </p:spPr>
+        <p:txBody>
+          <a:bodyPr wrap="square" rtlCol="0">
+            <a:spAutoFit/>
+          </a:bodyPr>
+          <a:lstStyle/>
+          <a:p>
+            <a:pPr marL="285750" indent="-285750">
+              <a:buFont typeface="Arial" panose="020B0604020202020204" pitchFamily="34" charset="0"/>
+              <a:buChar char="•"/>
+            </a:pPr>
+            <a:r>
+              <a:rPr lang="en-US" dirty="0" smtClean="0"/>
+              <a:t>Limited control over generated HTML</a:t>
+            </a:r>
+          </a:p>
+          <a:p>
+            <a:pPr marL="285750" indent="-285750">
+              <a:buFont typeface="Arial" panose="020B0604020202020204" pitchFamily="34" charset="0"/>
+              <a:buChar char="•"/>
+            </a:pPr>
+            <a:r>
+              <a:rPr lang="en-US" dirty="0" smtClean="0"/>
+              <a:t>Limited cross platform support – not intended to be used outside of MS environment</a:t>
+            </a:r>
+          </a:p>
+          <a:p>
+            <a:pPr marL="285750" indent="-285750">
+              <a:buFont typeface="Arial" panose="020B0604020202020204" pitchFamily="34" charset="0"/>
+              <a:buChar char="•"/>
+            </a:pPr>
+            <a:r>
+              <a:rPr lang="en-US" dirty="0" smtClean="0"/>
+              <a:t>Does not integrate well with </a:t>
+            </a:r>
+            <a:r>
+              <a:rPr lang="en-US" dirty="0" err="1" smtClean="0"/>
+              <a:t>Heroku</a:t>
+            </a:r>
+            <a:r>
+              <a:rPr lang="en-US" dirty="0" smtClean="0"/>
+              <a:t> </a:t>
+            </a:r>
+            <a:r>
+              <a:rPr lang="en-US" dirty="0" err="1" smtClean="0"/>
+              <a:t>PaaS</a:t>
+            </a:r>
+            <a:r>
+              <a:rPr lang="en-US" dirty="0" smtClean="0"/>
+              <a:t> hosting</a:t>
+            </a:r>
+          </a:p>
+          <a:p>
+            <a:pPr marL="285750" indent="-285750">
+              <a:buFont typeface="Arial" panose="020B0604020202020204" pitchFamily="34" charset="0"/>
+              <a:buChar char="•"/>
+            </a:pPr>
+            <a:r>
+              <a:rPr lang="en-US" dirty="0" smtClean="0"/>
+              <a:t>Visual studio = expensive upkeep and resource intensive</a:t>
+            </a:r>
+          </a:p>
+          <a:p>
+            <a:pPr marL="285750" indent="-285750">
+              <a:buFont typeface="Arial" panose="020B0604020202020204" pitchFamily="34" charset="0"/>
+              <a:buChar char="•"/>
+            </a:pPr>
+            <a:endParaRPr lang="en-US" dirty="0" smtClean="0"/>
+          </a:p>
+        </p:txBody>
+      </p:sp>
+      <p:sp>
+        <p:nvSpPr>
+          <p:cNvPr id="12" name="Title 1"/>
+          <p:cNvSpPr>
+            <a:spLocks noGrp="1"/>
+          </p:cNvSpPr>
+          <p:nvPr>
+            <p:ph type="title"/>
+          </p:nvPr>
+        </p:nvSpPr>
+        <p:spPr>
+          <a:xfrm>
+            <a:off x="1420515" y="393045"/>
+            <a:ext cx="10018713" cy="1752599"/>
+          </a:xfrm>
+        </p:spPr>
+        <p:txBody>
+          <a:bodyPr/>
+          <a:lstStyle/>
+          <a:p>
+            <a:r>
+              <a:rPr lang="en-US" dirty="0" err="1" smtClean="0"/>
+              <a:t>vs</a:t>
+            </a:r>
+            <a:r>
+              <a:rPr lang="en-US" dirty="0" smtClean="0"/>
+              <a:t> </a:t>
+            </a:r>
+            <a:endParaRPr lang="en-US" dirty="0"/>
+          </a:p>
+        </p:txBody>
+      </p:sp>
+      <p:pic>
+        <p:nvPicPr>
+          <p:cNvPr id="13" name="Picture 12"/>
+          <p:cNvPicPr>
+            <a:picLocks noChangeAspect="1"/>
+          </p:cNvPicPr>
+          <p:nvPr/>
+        </p:nvPicPr>
+        <p:blipFill>
+          <a:blip r:embed="rId2"/>
+          <a:stretch>
+            <a:fillRect/>
+          </a:stretch>
+        </p:blipFill>
+        <p:spPr>
+          <a:xfrm>
+            <a:off x="8336623" y="558162"/>
+            <a:ext cx="2349098" cy="1439030"/>
+          </a:xfrm>
+          <a:prstGeom prst="rect">
+            <a:avLst/>
+          </a:prstGeom>
+        </p:spPr>
+      </p:pic>
+      <p:pic>
+        <p:nvPicPr>
+          <p:cNvPr id="14" name="Picture 13"/>
+          <p:cNvPicPr>
+            <a:picLocks noChangeAspect="1"/>
+          </p:cNvPicPr>
+          <p:nvPr/>
+        </p:nvPicPr>
+        <p:blipFill>
+          <a:blip r:embed="rId3"/>
+          <a:stretch>
+            <a:fillRect/>
+          </a:stretch>
+        </p:blipFill>
+        <p:spPr>
+          <a:xfrm>
+            <a:off x="2462646" y="558162"/>
+            <a:ext cx="2906796" cy="1194574"/>
+          </a:xfrm>
+          <a:prstGeom prst="rect">
+            <a:avLst/>
+          </a:prstGeom>
+        </p:spPr>
+      </p:pic>
+      <p:sp>
+        <p:nvSpPr>
+          <p:cNvPr id="15" name="TextBox 14"/>
+          <p:cNvSpPr txBox="1"/>
+          <p:nvPr/>
+        </p:nvSpPr>
+        <p:spPr>
+          <a:xfrm>
+            <a:off x="3590978" y="2153567"/>
+            <a:ext cx="5677786" cy="369332"/>
+          </a:xfrm>
+          <a:prstGeom prst="rect">
+            <a:avLst/>
+          </a:prstGeom>
+          <a:noFill/>
+        </p:spPr>
+        <p:txBody>
+          <a:bodyPr wrap="square" rtlCol="0">
+            <a:spAutoFit/>
+          </a:bodyPr>
+          <a:lstStyle/>
+          <a:p>
+            <a:pPr algn="ctr"/>
+            <a:r>
+              <a:rPr lang="en-US" dirty="0" smtClean="0"/>
+              <a:t>Cons</a:t>
+            </a:r>
+            <a:endParaRPr lang="en-US" dirty="0"/>
+          </a:p>
+        </p:txBody>
+      </p:sp>
+    </p:spTree>
+    <p:extLst>
+      <p:ext uri="{BB962C8B-B14F-4D97-AF65-F5344CB8AC3E}">
+        <p14:creationId xmlns:p14="http://schemas.microsoft.com/office/powerpoint/2010/main" val="2482360767"/>
+      </p:ext>
+    </p:extLst>
+  </p:cSld>
+  <p:clrMapOvr>
+    <a:masterClrMapping/>
+  </p:clrMapOvr>
+  <p:timing>
+    <p:tnLst>
+      <p:par>
+        <p:cTn id="1" dur="indefinite" restart="never" nodeType="tmRoot">
+          <p:childTnLst>
+            <p:seq concurrent="1" nextAc="seek">
+              <p:cTn id="2" dur="indefinite" nodeType="mainSeq">
+                <p:childTnLst>
+                  <p:par>
+                    <p:cTn id="3" fill="hold">
+                      <p:stCondLst>
+                        <p:cond delay="indefinite"/>
+                      </p:stCondLst>
+                      <p:childTnLst>
+                        <p:par>
+                          <p:cTn id="4" fill="hold">
+                            <p:stCondLst>
+                              <p:cond delay="0"/>
+                            </p:stCondLst>
+                            <p:childTnLst>
+                              <p:par>
+                                <p:cTn id="5" presetID="1" presetClass="entr" presetSubtype="0" fill="hold" grpId="0" nodeType="clickEffect">
+                                  <p:stCondLst>
+                                    <p:cond delay="0"/>
+                                  </p:stCondLst>
+                                  <p:childTnLst>
+                                    <p:set>
+                                      <p:cBhvr>
+                                        <p:cTn id="6" dur="1" fill="hold">
+                                          <p:stCondLst>
+                                            <p:cond delay="0"/>
+                                          </p:stCondLst>
+                                        </p:cTn>
+                                        <p:tgtEl>
+                                          <p:spTgt spid="15"/>
+                                        </p:tgtEl>
+                                        <p:attrNameLst>
+                                          <p:attrName>style.visibility</p:attrName>
+                                        </p:attrNameLst>
+                                      </p:cBhvr>
+                                      <p:to>
+                                        <p:strVal val="visible"/>
+                                      </p:to>
+                                    </p:set>
+                                  </p:childTnLst>
+                                </p:cTn>
+                              </p:par>
+                            </p:childTnLst>
+                          </p:cTn>
+                        </p:par>
+                      </p:childTnLst>
+                    </p:cTn>
+                  </p:par>
+                  <p:par>
+                    <p:cTn id="7" fill="hold">
+                      <p:stCondLst>
+                        <p:cond delay="indefinite"/>
+                      </p:stCondLst>
+                      <p:childTnLst>
+                        <p:par>
+                          <p:cTn id="8" fill="hold">
+                            <p:stCondLst>
+                              <p:cond delay="0"/>
+                            </p:stCondLst>
+                            <p:childTnLst>
+                              <p:par>
+                                <p:cTn id="9" presetID="1" presetClass="entr" presetSubtype="0" fill="hold" nodeType="clickEffect">
+                                  <p:stCondLst>
+                                    <p:cond delay="0"/>
+                                  </p:stCondLst>
+                                  <p:childTnLst>
+                                    <p:set>
+                                      <p:cBhvr>
+                                        <p:cTn id="10" dur="1" fill="hold">
+                                          <p:stCondLst>
+                                            <p:cond delay="0"/>
+                                          </p:stCondLst>
+                                        </p:cTn>
+                                        <p:tgtEl>
+                                          <p:spTgt spid="8">
+                                            <p:txEl>
+                                              <p:pRg st="0" end="0"/>
+                                            </p:txEl>
+                                          </p:spTgt>
+                                        </p:tgtEl>
+                                        <p:attrNameLst>
+                                          <p:attrName>style.visibility</p:attrName>
+                                        </p:attrNameLst>
+                                      </p:cBhvr>
+                                      <p:to>
+                                        <p:strVal val="visible"/>
+                                      </p:to>
+                                    </p:set>
+                                  </p:childTnLst>
+                                </p:cTn>
+                              </p:par>
+                            </p:childTnLst>
+                          </p:cTn>
+                        </p:par>
+                      </p:childTnLst>
+                    </p:cTn>
+                  </p:par>
+                  <p:par>
+                    <p:cTn id="11" fill="hold">
+                      <p:stCondLst>
+                        <p:cond delay="indefinite"/>
+                      </p:stCondLst>
+                      <p:childTnLst>
+                        <p:par>
+                          <p:cTn id="12" fill="hold">
+                            <p:stCondLst>
+                              <p:cond delay="0"/>
+                            </p:stCondLst>
+                            <p:childTnLst>
+                              <p:par>
+                                <p:cTn id="13" presetID="1" presetClass="entr" presetSubtype="0" fill="hold" nodeType="clickEffect">
+                                  <p:stCondLst>
+                                    <p:cond delay="0"/>
+                                  </p:stCondLst>
+                                  <p:childTnLst>
+                                    <p:set>
+                                      <p:cBhvr>
+                                        <p:cTn id="14" dur="1" fill="hold">
+                                          <p:stCondLst>
+                                            <p:cond delay="0"/>
+                                          </p:stCondLst>
+                                        </p:cTn>
+                                        <p:tgtEl>
+                                          <p:spTgt spid="8">
+                                            <p:txEl>
+                                              <p:pRg st="1" end="1"/>
+                                            </p:txEl>
+                                          </p:spTgt>
+                                        </p:tgtEl>
+                                        <p:attrNameLst>
+                                          <p:attrName>style.visibility</p:attrName>
+                                        </p:attrNameLst>
+                                      </p:cBhvr>
+                                      <p:to>
+                                        <p:strVal val="visible"/>
+                                      </p:to>
+                                    </p:set>
+                                  </p:childTnLst>
+                                </p:cTn>
+                              </p:par>
+                            </p:childTnLst>
+                          </p:cTn>
+                        </p:par>
+                      </p:childTnLst>
+                    </p:cTn>
+                  </p:par>
+                  <p:par>
+                    <p:cTn id="15" fill="hold">
+                      <p:stCondLst>
+                        <p:cond delay="indefinite"/>
+                      </p:stCondLst>
+                      <p:childTnLst>
+                        <p:par>
+                          <p:cTn id="16" fill="hold">
+                            <p:stCondLst>
+                              <p:cond delay="0"/>
+                            </p:stCondLst>
+                            <p:childTnLst>
+                              <p:par>
+                                <p:cTn id="17" presetID="1" presetClass="entr" presetSubtype="0" fill="hold" nodeType="clickEffect">
+                                  <p:stCondLst>
+                                    <p:cond delay="0"/>
+                                  </p:stCondLst>
+                                  <p:childTnLst>
+                                    <p:set>
+                                      <p:cBhvr>
+                                        <p:cTn id="18" dur="1" fill="hold">
+                                          <p:stCondLst>
+                                            <p:cond delay="0"/>
+                                          </p:stCondLst>
+                                        </p:cTn>
+                                        <p:tgtEl>
+                                          <p:spTgt spid="8">
+                                            <p:txEl>
+                                              <p:pRg st="2" end="2"/>
+                                            </p:txEl>
+                                          </p:spTgt>
+                                        </p:tgtEl>
+                                        <p:attrNameLst>
+                                          <p:attrName>style.visibility</p:attrName>
+                                        </p:attrNameLst>
+                                      </p:cBhvr>
+                                      <p:to>
+                                        <p:strVal val="visible"/>
+                                      </p:to>
+                                    </p:set>
+                                  </p:childTnLst>
+                                </p:cTn>
+                              </p:par>
+                            </p:childTnLst>
+                          </p:cTn>
+                        </p:par>
+                      </p:childTnLst>
+                    </p:cTn>
+                  </p:par>
+                  <p:par>
+                    <p:cTn id="19" fill="hold">
+                      <p:stCondLst>
+                        <p:cond delay="indefinite"/>
+                      </p:stCondLst>
+                      <p:childTnLst>
+                        <p:par>
+                          <p:cTn id="20" fill="hold">
+                            <p:stCondLst>
+                              <p:cond delay="0"/>
+                            </p:stCondLst>
+                            <p:childTnLst>
+                              <p:par>
+                                <p:cTn id="21" presetID="1" presetClass="entr" presetSubtype="0" fill="hold" nodeType="clickEffect">
+                                  <p:stCondLst>
+                                    <p:cond delay="0"/>
+                                  </p:stCondLst>
+                                  <p:childTnLst>
+                                    <p:set>
+                                      <p:cBhvr>
+                                        <p:cTn id="22" dur="1" fill="hold">
+                                          <p:stCondLst>
+                                            <p:cond delay="0"/>
+                                          </p:stCondLst>
+                                        </p:cTn>
+                                        <p:tgtEl>
+                                          <p:spTgt spid="8">
+                                            <p:txEl>
+                                              <p:pRg st="3" end="3"/>
+                                            </p:txEl>
+                                          </p:spTgt>
+                                        </p:tgtEl>
+                                        <p:attrNameLst>
+                                          <p:attrName>style.visibility</p:attrName>
+                                        </p:attrNameLst>
+                                      </p:cBhvr>
+                                      <p:to>
+                                        <p:strVal val="visible"/>
+                                      </p:to>
+                                    </p:set>
+                                  </p:childTnLst>
+                                </p:cTn>
+                              </p:par>
+                            </p:childTnLst>
+                          </p:cTn>
+                        </p:par>
+                      </p:childTnLst>
+                    </p:cTn>
+                  </p:par>
+                  <p:par>
+                    <p:cTn id="23" fill="hold">
+                      <p:stCondLst>
+                        <p:cond delay="indefinite"/>
+                      </p:stCondLst>
+                      <p:childTnLst>
+                        <p:par>
+                          <p:cTn id="24" fill="hold">
+                            <p:stCondLst>
+                              <p:cond delay="0"/>
+                            </p:stCondLst>
+                            <p:childTnLst>
+                              <p:par>
+                                <p:cTn id="25" presetID="1" presetClass="entr" presetSubtype="0" fill="hold" nodeType="clickEffect">
+                                  <p:stCondLst>
+                                    <p:cond delay="0"/>
+                                  </p:stCondLst>
+                                  <p:childTnLst>
+                                    <p:set>
+                                      <p:cBhvr>
+                                        <p:cTn id="26" dur="1" fill="hold">
+                                          <p:stCondLst>
+                                            <p:cond delay="0"/>
+                                          </p:stCondLst>
+                                        </p:cTn>
+                                        <p:tgtEl>
+                                          <p:spTgt spid="7">
+                                            <p:txEl>
+                                              <p:pRg st="0" end="0"/>
+                                            </p:txEl>
+                                          </p:spTgt>
+                                        </p:tgtEl>
+                                        <p:attrNameLst>
+                                          <p:attrName>style.visibility</p:attrName>
+                                        </p:attrNameLst>
+                                      </p:cBhvr>
+                                      <p:to>
+                                        <p:strVal val="visible"/>
+                                      </p:to>
+                                    </p:set>
+                                  </p:childTnLst>
+                                </p:cTn>
+                              </p:par>
+                            </p:childTnLst>
+                          </p:cTn>
+                        </p:par>
+                      </p:childTnLst>
+                    </p:cTn>
+                  </p:par>
+                  <p:par>
+                    <p:cTn id="27" fill="hold">
+                      <p:stCondLst>
+                        <p:cond delay="indefinite"/>
+                      </p:stCondLst>
+                      <p:childTnLst>
+                        <p:par>
+                          <p:cTn id="28" fill="hold">
+                            <p:stCondLst>
+                              <p:cond delay="0"/>
+                            </p:stCondLst>
+                            <p:childTnLst>
+                              <p:par>
+                                <p:cTn id="29" presetID="1" presetClass="entr" presetSubtype="0" fill="hold" nodeType="clickEffect">
+                                  <p:stCondLst>
+                                    <p:cond delay="0"/>
+                                  </p:stCondLst>
+                                  <p:childTnLst>
+                                    <p:set>
+                                      <p:cBhvr>
+                                        <p:cTn id="30" dur="1" fill="hold">
+                                          <p:stCondLst>
+                                            <p:cond delay="0"/>
+                                          </p:stCondLst>
+                                        </p:cTn>
+                                        <p:tgtEl>
+                                          <p:spTgt spid="7">
+                                            <p:txEl>
+                                              <p:pRg st="1" end="1"/>
+                                            </p:txEl>
+                                          </p:spTgt>
+                                        </p:tgtEl>
+                                        <p:attrNameLst>
+                                          <p:attrName>style.visibility</p:attrName>
+                                        </p:attrNameLst>
+                                      </p:cBhvr>
+                                      <p:to>
+                                        <p:strVal val="visible"/>
+                                      </p:to>
+                                    </p:set>
+                                  </p:childTnLst>
+                                </p:cTn>
+                              </p:par>
+                            </p:childTnLst>
+                          </p:cTn>
+                        </p:par>
+                      </p:childTnLst>
+                    </p:cTn>
+                  </p:par>
+                  <p:par>
+                    <p:cTn id="31" fill="hold">
+                      <p:stCondLst>
+                        <p:cond delay="indefinite"/>
+                      </p:stCondLst>
+                      <p:childTnLst>
+                        <p:par>
+                          <p:cTn id="32" fill="hold">
+                            <p:stCondLst>
+                              <p:cond delay="0"/>
+                            </p:stCondLst>
+                            <p:childTnLst>
+                              <p:par>
+                                <p:cTn id="33" presetID="1" presetClass="entr" presetSubtype="0" fill="hold" nodeType="clickEffect">
+                                  <p:stCondLst>
+                                    <p:cond delay="0"/>
+                                  </p:stCondLst>
+                                  <p:childTnLst>
+                                    <p:set>
+                                      <p:cBhvr>
+                                        <p:cTn id="34" dur="1" fill="hold">
+                                          <p:stCondLst>
+                                            <p:cond delay="0"/>
+                                          </p:stCondLst>
+                                        </p:cTn>
+                                        <p:tgtEl>
+                                          <p:spTgt spid="7">
+                                            <p:txEl>
+                                              <p:pRg st="2" end="2"/>
+                                            </p:txEl>
+                                          </p:spTgt>
+                                        </p:tgtEl>
+                                        <p:attrNameLst>
+                                          <p:attrName>style.visibility</p:attrName>
+                                        </p:attrNameLst>
+                                      </p:cBhvr>
+                                      <p:to>
+                                        <p:strVal val="visible"/>
+                                      </p:to>
+                                    </p:set>
+                                  </p:childTnLst>
+                                </p:cTn>
+                              </p:par>
+                            </p:childTnLst>
+                          </p:cTn>
+                        </p:par>
+                      </p:childTnLst>
+                    </p:cTn>
+                  </p:par>
+                  <p:par>
+                    <p:cTn id="35" fill="hold">
+                      <p:stCondLst>
+                        <p:cond delay="indefinite"/>
+                      </p:stCondLst>
+                      <p:childTnLst>
+                        <p:par>
+                          <p:cTn id="36" fill="hold">
+                            <p:stCondLst>
+                              <p:cond delay="0"/>
+                            </p:stCondLst>
+                            <p:childTnLst>
+                              <p:par>
+                                <p:cTn id="37" presetID="1" presetClass="entr" presetSubtype="0" fill="hold" nodeType="clickEffect">
+                                  <p:stCondLst>
+                                    <p:cond delay="0"/>
+                                  </p:stCondLst>
+                                  <p:childTnLst>
+                                    <p:set>
+                                      <p:cBhvr>
+                                        <p:cTn id="38" dur="1" fill="hold">
+                                          <p:stCondLst>
+                                            <p:cond delay="0"/>
+                                          </p:stCondLst>
+                                        </p:cTn>
+                                        <p:tgtEl>
+                                          <p:spTgt spid="7">
+                                            <p:txEl>
+                                              <p:pRg st="3" end="3"/>
+                                            </p:txEl>
+                                          </p:spTgt>
+                                        </p:tgtEl>
+                                        <p:attrNameLst>
+                                          <p:attrName>style.visibility</p:attrName>
+                                        </p:attrNameLst>
+                                      </p:cBhvr>
+                                      <p:to>
+                                        <p:strVal val="visible"/>
+                                      </p:to>
+                                    </p:set>
+                                  </p:childTnLst>
+                                </p:cTn>
+                              </p:par>
+                            </p:childTnLst>
+                          </p:cTn>
+                        </p:par>
+                      </p:childTnLst>
+                    </p:cTn>
+                  </p:par>
+                </p:childTnLst>
+              </p:cTn>
+              <p:prevCondLst>
+                <p:cond evt="onPrev" delay="0">
+                  <p:tgtEl>
+                    <p:sldTgt/>
+                  </p:tgtEl>
+                </p:cond>
+              </p:prevCondLst>
+              <p:nextCondLst>
+                <p:cond evt="onNext" delay="0">
+                  <p:tgtEl>
+                    <p:sldTgt/>
+                  </p:tgtEl>
+                </p:cond>
+              </p:nextCondLst>
+            </p:seq>
+          </p:childTnLst>
+        </p:cTn>
+      </p:par>
+    </p:tnLst>
+    <p:bldLst>
+      <p:bldP spid="15" grpId="0"/>
+    </p:bldLst>
+  </p:timing>
+</p:sld>
+</file>
+
 <file path=ppt/theme/theme1.xml><?xml version="1.0" encoding="utf-8"?>
 <a:theme xmlns:a="http://schemas.openxmlformats.org/drawingml/2006/main" name="Parallax">
   <a:themeElements>

</xml_diff>